<commit_message>
fix: change in ppt
</commit_message>
<xml_diff>
--- a/e-commerce-case-study/ecommerce_ppt.pptx
+++ b/e-commerce-case-study/ecommerce_ppt.pptx
@@ -5,10 +5,10 @@
     <p:sldMasterId id="2147484145" r:id="rId4"/>
   </p:sldMasterIdLst>
   <p:notesMasterIdLst>
-    <p:notesMasterId r:id="rId22"/>
+    <p:notesMasterId r:id="rId20"/>
   </p:notesMasterIdLst>
   <p:handoutMasterIdLst>
-    <p:handoutMasterId r:id="rId23"/>
+    <p:handoutMasterId r:id="rId21"/>
   </p:handoutMasterIdLst>
   <p:sldIdLst>
     <p:sldId id="329" r:id="rId5"/>
@@ -24,10 +24,8 @@
     <p:sldId id="286" r:id="rId15"/>
     <p:sldId id="319" r:id="rId16"/>
     <p:sldId id="320" r:id="rId17"/>
-    <p:sldId id="322" r:id="rId18"/>
-    <p:sldId id="323" r:id="rId19"/>
-    <p:sldId id="321" r:id="rId20"/>
-    <p:sldId id="327" r:id="rId21"/>
+    <p:sldId id="321" r:id="rId18"/>
+    <p:sldId id="327" r:id="rId19"/>
   </p:sldIdLst>
   <p:sldSz cx="12192000" cy="6858000"/>
   <p:notesSz cx="6858000" cy="9144000"/>
@@ -6414,7 +6412,7 @@
               <a:rPr lang="en-US" smtClean="0">
                 <a:latin typeface="Tw Cen MT" panose="020B0602020104020603" pitchFamily="34" charset="0"/>
               </a:rPr>
-              <a:t>11/14/2022</a:t>
+              <a:t>11/16/2022</a:t>
             </a:fld>
             <a:endParaRPr lang="en-US" dirty="0">
               <a:latin typeface="Tw Cen MT" panose="020B0602020104020603" pitchFamily="34" charset="0"/>
@@ -6604,7 +6602,7 @@
             <a:fld id="{AF4A386A-BFE4-4655-9801-CBB04655F27A}" type="datetimeFigureOut">
               <a:rPr lang="en-US" noProof="0" smtClean="0"/>
               <a:pPr/>
-              <a:t>11/14/2022</a:t>
+              <a:t>11/16/2022</a:t>
             </a:fld>
             <a:endParaRPr lang="en-US" noProof="0" dirty="0"/>
           </a:p>
@@ -7206,7 +7204,7 @@
     </p:spTree>
     <p:extLst>
       <p:ext uri="{BB962C8B-B14F-4D97-AF65-F5344CB8AC3E}">
-        <p14:creationId xmlns:p14="http://schemas.microsoft.com/office/powerpoint/2010/main" val="2025269627"/>
+        <p14:creationId xmlns:p14="http://schemas.microsoft.com/office/powerpoint/2010/main" val="242870816"/>
       </p:ext>
     </p:extLst>
   </p:cSld>
@@ -7283,176 +7281,6 @@
               <a:rPr lang="en-US" noProof="0" smtClean="0"/>
               <a:pPr/>
               <a:t>15</a:t>
-            </a:fld>
-            <a:endParaRPr lang="en-US" noProof="0" dirty="0"/>
-          </a:p>
-        </p:txBody>
-      </p:sp>
-    </p:spTree>
-    <p:extLst>
-      <p:ext uri="{BB962C8B-B14F-4D97-AF65-F5344CB8AC3E}">
-        <p14:creationId xmlns:p14="http://schemas.microsoft.com/office/powerpoint/2010/main" val="299729630"/>
-      </p:ext>
-    </p:extLst>
-  </p:cSld>
-  <p:clrMapOvr>
-    <a:masterClrMapping/>
-  </p:clrMapOvr>
-</p:notes>
-</file>
-
-<file path=ppt/notesSlides/notesSlide14.xml><?xml version="1.0" encoding="utf-8"?>
-<p:notes xmlns:a="http://schemas.openxmlformats.org/drawingml/2006/main" xmlns:r="http://schemas.openxmlformats.org/officeDocument/2006/relationships" xmlns:p="http://schemas.openxmlformats.org/presentationml/2006/main">
-  <p:cSld>
-    <p:spTree>
-      <p:nvGrpSpPr>
-        <p:cNvPr id="1" name=""/>
-        <p:cNvGrpSpPr/>
-        <p:nvPr/>
-      </p:nvGrpSpPr>
-      <p:grpSpPr>
-        <a:xfrm>
-          <a:off x="0" y="0"/>
-          <a:ext cx="0" cy="0"/>
-          <a:chOff x="0" y="0"/>
-          <a:chExt cx="0" cy="0"/>
-        </a:xfrm>
-      </p:grpSpPr>
-      <p:sp>
-        <p:nvSpPr>
-          <p:cNvPr id="2" name="Slide Image Placeholder 1"/>
-          <p:cNvSpPr>
-            <a:spLocks noGrp="1" noRot="1" noChangeAspect="1"/>
-          </p:cNvSpPr>
-          <p:nvPr>
-            <p:ph type="sldImg"/>
-          </p:nvPr>
-        </p:nvSpPr>
-        <p:spPr/>
-      </p:sp>
-      <p:sp>
-        <p:nvSpPr>
-          <p:cNvPr id="3" name="Notes Placeholder 2"/>
-          <p:cNvSpPr>
-            <a:spLocks noGrp="1"/>
-          </p:cNvSpPr>
-          <p:nvPr>
-            <p:ph type="body" idx="1"/>
-          </p:nvPr>
-        </p:nvSpPr>
-        <p:spPr/>
-        <p:txBody>
-          <a:bodyPr/>
-          <a:lstStyle/>
-          <a:p>
-            <a:endParaRPr lang="en-US" dirty="0"/>
-          </a:p>
-        </p:txBody>
-      </p:sp>
-      <p:sp>
-        <p:nvSpPr>
-          <p:cNvPr id="4" name="Slide Number Placeholder 3"/>
-          <p:cNvSpPr>
-            <a:spLocks noGrp="1"/>
-          </p:cNvSpPr>
-          <p:nvPr>
-            <p:ph type="sldNum" sz="quarter" idx="5"/>
-          </p:nvPr>
-        </p:nvSpPr>
-        <p:spPr/>
-        <p:txBody>
-          <a:bodyPr/>
-          <a:lstStyle/>
-          <a:p>
-            <a:fld id="{DAE5FABD-26C8-4F74-B1E3-45BC91BC9D7B}" type="slidenum">
-              <a:rPr lang="en-US" noProof="0" smtClean="0"/>
-              <a:pPr/>
-              <a:t>16</a:t>
-            </a:fld>
-            <a:endParaRPr lang="en-US" noProof="0" dirty="0"/>
-          </a:p>
-        </p:txBody>
-      </p:sp>
-    </p:spTree>
-    <p:extLst>
-      <p:ext uri="{BB962C8B-B14F-4D97-AF65-F5344CB8AC3E}">
-        <p14:creationId xmlns:p14="http://schemas.microsoft.com/office/powerpoint/2010/main" val="242870816"/>
-      </p:ext>
-    </p:extLst>
-  </p:cSld>
-  <p:clrMapOvr>
-    <a:masterClrMapping/>
-  </p:clrMapOvr>
-</p:notes>
-</file>
-
-<file path=ppt/notesSlides/notesSlide15.xml><?xml version="1.0" encoding="utf-8"?>
-<p:notes xmlns:a="http://schemas.openxmlformats.org/drawingml/2006/main" xmlns:r="http://schemas.openxmlformats.org/officeDocument/2006/relationships" xmlns:p="http://schemas.openxmlformats.org/presentationml/2006/main">
-  <p:cSld>
-    <p:spTree>
-      <p:nvGrpSpPr>
-        <p:cNvPr id="1" name=""/>
-        <p:cNvGrpSpPr/>
-        <p:nvPr/>
-      </p:nvGrpSpPr>
-      <p:grpSpPr>
-        <a:xfrm>
-          <a:off x="0" y="0"/>
-          <a:ext cx="0" cy="0"/>
-          <a:chOff x="0" y="0"/>
-          <a:chExt cx="0" cy="0"/>
-        </a:xfrm>
-      </p:grpSpPr>
-      <p:sp>
-        <p:nvSpPr>
-          <p:cNvPr id="2" name="Slide Image Placeholder 1"/>
-          <p:cNvSpPr>
-            <a:spLocks noGrp="1" noRot="1" noChangeAspect="1"/>
-          </p:cNvSpPr>
-          <p:nvPr>
-            <p:ph type="sldImg"/>
-          </p:nvPr>
-        </p:nvSpPr>
-        <p:spPr/>
-      </p:sp>
-      <p:sp>
-        <p:nvSpPr>
-          <p:cNvPr id="3" name="Notes Placeholder 2"/>
-          <p:cNvSpPr>
-            <a:spLocks noGrp="1"/>
-          </p:cNvSpPr>
-          <p:nvPr>
-            <p:ph type="body" idx="1"/>
-          </p:nvPr>
-        </p:nvSpPr>
-        <p:spPr/>
-        <p:txBody>
-          <a:bodyPr/>
-          <a:lstStyle/>
-          <a:p>
-            <a:endParaRPr lang="en-US" dirty="0"/>
-          </a:p>
-        </p:txBody>
-      </p:sp>
-      <p:sp>
-        <p:nvSpPr>
-          <p:cNvPr id="4" name="Slide Number Placeholder 3"/>
-          <p:cNvSpPr>
-            <a:spLocks noGrp="1"/>
-          </p:cNvSpPr>
-          <p:nvPr>
-            <p:ph type="sldNum" sz="quarter" idx="5"/>
-          </p:nvPr>
-        </p:nvSpPr>
-        <p:spPr/>
-        <p:txBody>
-          <a:bodyPr/>
-          <a:lstStyle/>
-          <a:p>
-            <a:fld id="{DAE5FABD-26C8-4F74-B1E3-45BC91BC9D7B}" type="slidenum">
-              <a:rPr lang="en-US" noProof="0" smtClean="0"/>
-              <a:pPr/>
-              <a:t>17</a:t>
             </a:fld>
             <a:endParaRPr lang="en-US" noProof="0" dirty="0"/>
           </a:p>
@@ -8338,7 +8166,7 @@
             <a:fld id="{B61BEF0D-F0BB-DE4B-95CE-6DB70DBA9567}" type="datetimeFigureOut">
               <a:rPr lang="en-US" smtClean="0"/>
               <a:pPr/>
-              <a:t>11/15/2022</a:t>
+              <a:t>11/16/2022</a:t>
             </a:fld>
             <a:endParaRPr lang="en-US" dirty="0"/>
           </a:p>
@@ -8616,7 +8444,7 @@
             <a:fld id="{B61BEF0D-F0BB-DE4B-95CE-6DB70DBA9567}" type="datetimeFigureOut">
               <a:rPr lang="en-US" smtClean="0"/>
               <a:pPr/>
-              <a:t>11/15/2022</a:t>
+              <a:t>11/16/2022</a:t>
             </a:fld>
             <a:endParaRPr lang="en-US" dirty="0"/>
           </a:p>
@@ -8813,7 +8641,7 @@
             <a:fld id="{B61BEF0D-F0BB-DE4B-95CE-6DB70DBA9567}" type="datetimeFigureOut">
               <a:rPr lang="en-US" smtClean="0"/>
               <a:pPr/>
-              <a:t>11/15/2022</a:t>
+              <a:t>11/16/2022</a:t>
             </a:fld>
             <a:endParaRPr lang="en-US" dirty="0"/>
           </a:p>
@@ -9087,7 +8915,7 @@
             <a:fld id="{B61BEF0D-F0BB-DE4B-95CE-6DB70DBA9567}" type="datetimeFigureOut">
               <a:rPr lang="en-US" smtClean="0"/>
               <a:pPr/>
-              <a:t>11/15/2022</a:t>
+              <a:t>11/16/2022</a:t>
             </a:fld>
             <a:endParaRPr lang="en-US" dirty="0"/>
           </a:p>
@@ -9417,7 +9245,7 @@
             <a:fld id="{B61BEF0D-F0BB-DE4B-95CE-6DB70DBA9567}" type="datetimeFigureOut">
               <a:rPr lang="en-US" smtClean="0"/>
               <a:pPr/>
-              <a:t>11/15/2022</a:t>
+              <a:t>11/16/2022</a:t>
             </a:fld>
             <a:endParaRPr lang="en-US" dirty="0"/>
           </a:p>
@@ -10039,7 +9867,7 @@
             <a:fld id="{B61BEF0D-F0BB-DE4B-95CE-6DB70DBA9567}" type="datetimeFigureOut">
               <a:rPr lang="en-US" smtClean="0"/>
               <a:pPr/>
-              <a:t>11/15/2022</a:t>
+              <a:t>11/16/2022</a:t>
             </a:fld>
             <a:endParaRPr lang="en-US" dirty="0"/>
           </a:p>
@@ -10889,7 +10717,7 @@
             <a:fld id="{B61BEF0D-F0BB-DE4B-95CE-6DB70DBA9567}" type="datetimeFigureOut">
               <a:rPr lang="en-US" smtClean="0"/>
               <a:pPr/>
-              <a:t>11/15/2022</a:t>
+              <a:t>11/16/2022</a:t>
             </a:fld>
             <a:endParaRPr lang="en-US" dirty="0"/>
           </a:p>
@@ -11062,7 +10890,7 @@
             <a:fld id="{B61BEF0D-F0BB-DE4B-95CE-6DB70DBA9567}" type="datetimeFigureOut">
               <a:rPr lang="en-US" smtClean="0"/>
               <a:pPr/>
-              <a:t>11/15/2022</a:t>
+              <a:t>11/16/2022</a:t>
             </a:fld>
             <a:endParaRPr lang="en-US" dirty="0"/>
           </a:p>
@@ -11245,7 +11073,7 @@
             <a:fld id="{B61BEF0D-F0BB-DE4B-95CE-6DB70DBA9567}" type="datetimeFigureOut">
               <a:rPr lang="en-US" smtClean="0"/>
               <a:pPr/>
-              <a:t>11/15/2022</a:t>
+              <a:t>11/16/2022</a:t>
             </a:fld>
             <a:endParaRPr lang="en-US" dirty="0"/>
           </a:p>
@@ -12691,7 +12519,7 @@
           <a:p>
             <a:fld id="{52647F38-B617-4D2F-AE0A-013F0C4D2C57}" type="datetimeFigureOut">
               <a:rPr lang="en-US" smtClean="0"/>
-              <a:t>11/15/2022</a:t>
+              <a:t>11/16/2022</a:t>
             </a:fld>
             <a:endParaRPr lang="en-US" dirty="0"/>
           </a:p>
@@ -17682,7 +17510,7 @@
             <a:fld id="{B61BEF0D-F0BB-DE4B-95CE-6DB70DBA9567}" type="datetimeFigureOut">
               <a:rPr lang="en-US" smtClean="0"/>
               <a:pPr/>
-              <a:t>11/15/2022</a:t>
+              <a:t>11/16/2022</a:t>
             </a:fld>
             <a:endParaRPr lang="en-US" dirty="0"/>
           </a:p>
@@ -21492,7 +21320,7 @@
           <a:p>
             <a:fld id="{05BFA754-D5C3-4E66-96A6-867B257F58DC}" type="datetimeFigureOut">
               <a:rPr lang="en-US" smtClean="0"/>
-              <a:t>11/15/2022</a:t>
+              <a:t>11/16/2022</a:t>
             </a:fld>
             <a:endParaRPr lang="en-US" dirty="0"/>
           </a:p>
@@ -25302,7 +25130,7 @@
             <a:fld id="{B61BEF0D-F0BB-DE4B-95CE-6DB70DBA9567}" type="datetimeFigureOut">
               <a:rPr lang="en-US" smtClean="0"/>
               <a:pPr/>
-              <a:t>11/15/2022</a:t>
+              <a:t>11/16/2022</a:t>
             </a:fld>
             <a:endParaRPr lang="en-US" dirty="0"/>
           </a:p>
@@ -35828,7 +35656,7 @@
             <a:fld id="{B61BEF0D-F0BB-DE4B-95CE-6DB70DBA9567}" type="datetimeFigureOut">
               <a:rPr lang="en-US" smtClean="0"/>
               <a:pPr/>
-              <a:t>11/15/2022</a:t>
+              <a:t>11/16/2022</a:t>
             </a:fld>
             <a:endParaRPr lang="en-US" dirty="0"/>
           </a:p>
@@ -40032,7 +39860,7 @@
             <a:fld id="{B61BEF0D-F0BB-DE4B-95CE-6DB70DBA9567}" type="datetimeFigureOut">
               <a:rPr lang="en-US" smtClean="0"/>
               <a:pPr/>
-              <a:t>11/15/2022</a:t>
+              <a:t>11/16/2022</a:t>
             </a:fld>
             <a:endParaRPr lang="en-US" dirty="0"/>
           </a:p>
@@ -41471,7 +41299,7 @@
             <a:fld id="{B61BEF0D-F0BB-DE4B-95CE-6DB70DBA9567}" type="datetimeFigureOut">
               <a:rPr lang="en-US" smtClean="0"/>
               <a:pPr/>
-              <a:t>11/15/2022</a:t>
+              <a:t>11/16/2022</a:t>
             </a:fld>
             <a:endParaRPr lang="en-US" dirty="0"/>
           </a:p>
@@ -41749,7 +41577,7 @@
             <a:fld id="{B61BEF0D-F0BB-DE4B-95CE-6DB70DBA9567}" type="datetimeFigureOut">
               <a:rPr lang="en-US" smtClean="0"/>
               <a:pPr/>
-              <a:t>11/15/2022</a:t>
+              <a:t>11/16/2022</a:t>
             </a:fld>
             <a:endParaRPr lang="en-US" dirty="0"/>
           </a:p>
@@ -42175,7 +42003,7 @@
             <a:fld id="{B61BEF0D-F0BB-DE4B-95CE-6DB70DBA9567}" type="datetimeFigureOut">
               <a:rPr lang="en-US" smtClean="0"/>
               <a:pPr/>
-              <a:t>11/15/2022</a:t>
+              <a:t>11/16/2022</a:t>
             </a:fld>
             <a:endParaRPr lang="en-US" dirty="0"/>
           </a:p>
@@ -43241,20 +43069,12 @@
           <a:lstStyle/>
           <a:p>
             <a:r>
-              <a:rPr lang="en-US" sz="4800" dirty="0" err="1">
-                <a:solidFill>
-                  <a:schemeClr val="tx1"/>
-                </a:solidFill>
-              </a:rPr>
-              <a:t>Pojo</a:t>
-            </a:r>
-            <a:r>
               <a:rPr lang="en-US" sz="4800" dirty="0">
                 <a:solidFill>
                   <a:schemeClr val="tx1"/>
                 </a:solidFill>
               </a:rPr>
-              <a:t> classes  </a:t>
+              <a:t>Entity</a:t>
             </a:r>
           </a:p>
         </p:txBody>
@@ -43293,10 +43113,10 @@
       </p:sp>
       <p:pic>
         <p:nvPicPr>
-          <p:cNvPr id="4" name="Picture 3">
-            <a:extLst>
-              <a:ext uri="{FF2B5EF4-FFF2-40B4-BE49-F238E27FC236}">
-                <a16:creationId xmlns:a16="http://schemas.microsoft.com/office/drawing/2014/main" id="{78A1644B-DF57-4D4E-BC71-37F01A8194EA}"/>
+          <p:cNvPr id="8" name="Picture 7">
+            <a:extLst>
+              <a:ext uri="{FF2B5EF4-FFF2-40B4-BE49-F238E27FC236}">
+                <a16:creationId xmlns:a16="http://schemas.microsoft.com/office/drawing/2014/main" id="{0B4F3A40-C309-4966-B6F2-1A3064FCFC71}"/>
               </a:ext>
             </a:extLst>
           </p:cNvPr>
@@ -43313,128 +43133,8 @@
         </p:blipFill>
         <p:spPr>
           <a:xfrm>
-            <a:off x="7536160" y="2044225"/>
-            <a:ext cx="2160240" cy="3617023"/>
-          </a:xfrm>
-          <a:prstGeom prst="rect">
-            <a:avLst/>
-          </a:prstGeom>
-        </p:spPr>
-      </p:pic>
-      <p:pic>
-        <p:nvPicPr>
-          <p:cNvPr id="5" name="Picture 4">
-            <a:extLst>
-              <a:ext uri="{FF2B5EF4-FFF2-40B4-BE49-F238E27FC236}">
-                <a16:creationId xmlns:a16="http://schemas.microsoft.com/office/drawing/2014/main" id="{A8A6982B-C708-4CF7-B2F1-908934F15FDB}"/>
-              </a:ext>
-            </a:extLst>
-          </p:cNvPr>
-          <p:cNvPicPr>
-            <a:picLocks noChangeAspect="1"/>
-          </p:cNvPicPr>
-          <p:nvPr/>
-        </p:nvPicPr>
-        <p:blipFill>
-          <a:blip r:embed="rId4"/>
-          <a:stretch>
-            <a:fillRect/>
-          </a:stretch>
-        </p:blipFill>
-        <p:spPr>
-          <a:xfrm>
-            <a:off x="5231692" y="2060847"/>
-            <a:ext cx="2088444" cy="3168353"/>
-          </a:xfrm>
-          <a:prstGeom prst="rect">
-            <a:avLst/>
-          </a:prstGeom>
-        </p:spPr>
-      </p:pic>
-      <p:pic>
-        <p:nvPicPr>
-          <p:cNvPr id="6" name="Picture 5">
-            <a:extLst>
-              <a:ext uri="{FF2B5EF4-FFF2-40B4-BE49-F238E27FC236}">
-                <a16:creationId xmlns:a16="http://schemas.microsoft.com/office/drawing/2014/main" id="{2EDF5D8B-7381-4B3E-A329-9DB2AB5779A3}"/>
-              </a:ext>
-            </a:extLst>
-          </p:cNvPr>
-          <p:cNvPicPr>
-            <a:picLocks noChangeAspect="1"/>
-          </p:cNvPicPr>
-          <p:nvPr/>
-        </p:nvPicPr>
-        <p:blipFill>
-          <a:blip r:embed="rId5"/>
-          <a:stretch>
-            <a:fillRect/>
-          </a:stretch>
-        </p:blipFill>
-        <p:spPr>
-          <a:xfrm>
-            <a:off x="839417" y="2060848"/>
-            <a:ext cx="1946498" cy="2808312"/>
-          </a:xfrm>
-          <a:prstGeom prst="rect">
-            <a:avLst/>
-          </a:prstGeom>
-        </p:spPr>
-      </p:pic>
-      <p:pic>
-        <p:nvPicPr>
-          <p:cNvPr id="7" name="Picture 6">
-            <a:extLst>
-              <a:ext uri="{FF2B5EF4-FFF2-40B4-BE49-F238E27FC236}">
-                <a16:creationId xmlns:a16="http://schemas.microsoft.com/office/drawing/2014/main" id="{AB23B0FD-A63A-4876-922A-BAB20056E44B}"/>
-              </a:ext>
-            </a:extLst>
-          </p:cNvPr>
-          <p:cNvPicPr>
-            <a:picLocks noChangeAspect="1"/>
-          </p:cNvPicPr>
-          <p:nvPr/>
-        </p:nvPicPr>
-        <p:blipFill>
-          <a:blip r:embed="rId6"/>
-          <a:stretch>
-            <a:fillRect/>
-          </a:stretch>
-        </p:blipFill>
-        <p:spPr>
-          <a:xfrm>
-            <a:off x="3045467" y="2060847"/>
-            <a:ext cx="1970413" cy="2809428"/>
-          </a:xfrm>
-          <a:prstGeom prst="rect">
-            <a:avLst/>
-          </a:prstGeom>
-        </p:spPr>
-      </p:pic>
-      <p:pic>
-        <p:nvPicPr>
-          <p:cNvPr id="9" name="Picture 8">
-            <a:extLst>
-              <a:ext uri="{FF2B5EF4-FFF2-40B4-BE49-F238E27FC236}">
-                <a16:creationId xmlns:a16="http://schemas.microsoft.com/office/drawing/2014/main" id="{E1737454-CED3-45A2-8232-63608469BC89}"/>
-              </a:ext>
-            </a:extLst>
-          </p:cNvPr>
-          <p:cNvPicPr>
-            <a:picLocks noChangeAspect="1"/>
-          </p:cNvPicPr>
-          <p:nvPr/>
-        </p:nvPicPr>
-        <p:blipFill>
-          <a:blip r:embed="rId7"/>
-          <a:stretch>
-            <a:fillRect/>
-          </a:stretch>
-        </p:blipFill>
-        <p:spPr>
-          <a:xfrm>
-            <a:off x="9964317" y="2060848"/>
-            <a:ext cx="1700632" cy="1499616"/>
+            <a:off x="2495600" y="1556792"/>
+            <a:ext cx="7608722" cy="4536504"/>
           </a:xfrm>
           <a:prstGeom prst="rect">
             <a:avLst/>
@@ -43572,10 +43272,10 @@
       </p:sp>
       <p:pic>
         <p:nvPicPr>
-          <p:cNvPr id="2" name="Picture 1">
-            <a:extLst>
-              <a:ext uri="{FF2B5EF4-FFF2-40B4-BE49-F238E27FC236}">
-                <a16:creationId xmlns:a16="http://schemas.microsoft.com/office/drawing/2014/main" id="{A1A07971-754C-46BD-BD83-295D520AE0E2}"/>
+          <p:cNvPr id="5" name="Picture 4">
+            <a:extLst>
+              <a:ext uri="{FF2B5EF4-FFF2-40B4-BE49-F238E27FC236}">
+                <a16:creationId xmlns:a16="http://schemas.microsoft.com/office/drawing/2014/main" id="{5D274B55-A915-448B-8B6F-9CBCCDF3BAEC}"/>
               </a:ext>
             </a:extLst>
           </p:cNvPr>
@@ -43592,98 +43292,8 @@
         </p:blipFill>
         <p:spPr>
           <a:xfrm>
-            <a:off x="4079776" y="1744806"/>
-            <a:ext cx="3419952" cy="3772426"/>
-          </a:xfrm>
-          <a:prstGeom prst="rect">
-            <a:avLst/>
-          </a:prstGeom>
-        </p:spPr>
-      </p:pic>
-      <p:pic>
-        <p:nvPicPr>
-          <p:cNvPr id="8" name="Picture 7">
-            <a:extLst>
-              <a:ext uri="{FF2B5EF4-FFF2-40B4-BE49-F238E27FC236}">
-                <a16:creationId xmlns:a16="http://schemas.microsoft.com/office/drawing/2014/main" id="{AC55C4FA-E6D2-47E9-9288-7100DABC8C03}"/>
-              </a:ext>
-            </a:extLst>
-          </p:cNvPr>
-          <p:cNvPicPr>
-            <a:picLocks noChangeAspect="1"/>
-          </p:cNvPicPr>
-          <p:nvPr/>
-        </p:nvPicPr>
-        <p:blipFill>
-          <a:blip r:embed="rId4"/>
-          <a:stretch>
-            <a:fillRect/>
-          </a:stretch>
-        </p:blipFill>
-        <p:spPr>
-          <a:xfrm>
-            <a:off x="7830084" y="1340768"/>
-            <a:ext cx="3810532" cy="2105319"/>
-          </a:xfrm>
-          <a:prstGeom prst="rect">
-            <a:avLst/>
-          </a:prstGeom>
-        </p:spPr>
-      </p:pic>
-      <p:pic>
-        <p:nvPicPr>
-          <p:cNvPr id="9" name="Picture 8">
-            <a:extLst>
-              <a:ext uri="{FF2B5EF4-FFF2-40B4-BE49-F238E27FC236}">
-                <a16:creationId xmlns:a16="http://schemas.microsoft.com/office/drawing/2014/main" id="{23797A23-66BB-4A78-92B8-F5154F0EB326}"/>
-              </a:ext>
-            </a:extLst>
-          </p:cNvPr>
-          <p:cNvPicPr>
-            <a:picLocks noChangeAspect="1"/>
-          </p:cNvPicPr>
-          <p:nvPr/>
-        </p:nvPicPr>
-        <p:blipFill>
-          <a:blip r:embed="rId5"/>
-          <a:stretch>
-            <a:fillRect/>
-          </a:stretch>
-        </p:blipFill>
-        <p:spPr>
-          <a:xfrm>
-            <a:off x="7830084" y="3717032"/>
-            <a:ext cx="3810532" cy="2329396"/>
-          </a:xfrm>
-          <a:prstGeom prst="rect">
-            <a:avLst/>
-          </a:prstGeom>
-        </p:spPr>
-      </p:pic>
-      <p:pic>
-        <p:nvPicPr>
-          <p:cNvPr id="10" name="Picture 9">
-            <a:extLst>
-              <a:ext uri="{FF2B5EF4-FFF2-40B4-BE49-F238E27FC236}">
-                <a16:creationId xmlns:a16="http://schemas.microsoft.com/office/drawing/2014/main" id="{2E062C7A-CE54-478F-B847-C67ED5426CFA}"/>
-              </a:ext>
-            </a:extLst>
-          </p:cNvPr>
-          <p:cNvPicPr>
-            <a:picLocks noChangeAspect="1"/>
-          </p:cNvPicPr>
-          <p:nvPr/>
-        </p:nvPicPr>
-        <p:blipFill>
-          <a:blip r:embed="rId6"/>
-          <a:stretch>
-            <a:fillRect/>
-          </a:stretch>
-        </p:blipFill>
-        <p:spPr>
-          <a:xfrm>
-            <a:off x="839416" y="2713967"/>
-            <a:ext cx="2972215" cy="1867161"/>
+            <a:off x="2999656" y="1844824"/>
+            <a:ext cx="5832647" cy="3960440"/>
           </a:xfrm>
           <a:prstGeom prst="rect">
             <a:avLst/>
@@ -43821,10 +43431,10 @@
       </p:sp>
       <p:pic>
         <p:nvPicPr>
-          <p:cNvPr id="4" name="Picture 3">
-            <a:extLst>
-              <a:ext uri="{FF2B5EF4-FFF2-40B4-BE49-F238E27FC236}">
-                <a16:creationId xmlns:a16="http://schemas.microsoft.com/office/drawing/2014/main" id="{89C2B7C8-EADA-492A-9BA7-DEA7D736DAFC}"/>
+          <p:cNvPr id="6" name="Picture 5">
+            <a:extLst>
+              <a:ext uri="{FF2B5EF4-FFF2-40B4-BE49-F238E27FC236}">
+                <a16:creationId xmlns:a16="http://schemas.microsoft.com/office/drawing/2014/main" id="{CE007F59-4C6D-49F9-A6C1-37A0B30C9E87}"/>
               </a:ext>
             </a:extLst>
           </p:cNvPr>
@@ -43841,190 +43451,14 @@
         </p:blipFill>
         <p:spPr>
           <a:xfrm>
-            <a:off x="1432020" y="1412777"/>
-            <a:ext cx="3943900" cy="2016223"/>
+            <a:off x="3287688" y="1772816"/>
+            <a:ext cx="5256584" cy="4248472"/>
           </a:xfrm>
           <a:prstGeom prst="rect">
             <a:avLst/>
           </a:prstGeom>
         </p:spPr>
       </p:pic>
-      <p:pic>
-        <p:nvPicPr>
-          <p:cNvPr id="5" name="Picture 4">
-            <a:extLst>
-              <a:ext uri="{FF2B5EF4-FFF2-40B4-BE49-F238E27FC236}">
-                <a16:creationId xmlns:a16="http://schemas.microsoft.com/office/drawing/2014/main" id="{55ABF103-23FE-4290-A078-6FAB73585DFA}"/>
-              </a:ext>
-            </a:extLst>
-          </p:cNvPr>
-          <p:cNvPicPr>
-            <a:picLocks noChangeAspect="1"/>
-          </p:cNvPicPr>
-          <p:nvPr/>
-        </p:nvPicPr>
-        <p:blipFill>
-          <a:blip r:embed="rId4"/>
-          <a:stretch>
-            <a:fillRect/>
-          </a:stretch>
-        </p:blipFill>
-        <p:spPr>
-          <a:xfrm>
-            <a:off x="6707656" y="1412776"/>
-            <a:ext cx="3924848" cy="2865488"/>
-          </a:xfrm>
-          <a:prstGeom prst="rect">
-            <a:avLst/>
-          </a:prstGeom>
-        </p:spPr>
-      </p:pic>
-      <p:cxnSp>
-        <p:nvCxnSpPr>
-          <p:cNvPr id="12" name="Straight Arrow Connector 11">
-            <a:extLst>
-              <a:ext uri="{FF2B5EF4-FFF2-40B4-BE49-F238E27FC236}">
-                <a16:creationId xmlns:a16="http://schemas.microsoft.com/office/drawing/2014/main" id="{5B16AE55-AE1A-415B-8291-87F24F065BAB}"/>
-              </a:ext>
-            </a:extLst>
-          </p:cNvPr>
-          <p:cNvCxnSpPr>
-            <a:cxnSpLocks/>
-          </p:cNvCxnSpPr>
-          <p:nvPr/>
-        </p:nvCxnSpPr>
-        <p:spPr>
-          <a:xfrm>
-            <a:off x="5375920" y="2492896"/>
-            <a:ext cx="1272912" cy="0"/>
-          </a:xfrm>
-          <a:prstGeom prst="straightConnector1">
-            <a:avLst/>
-          </a:prstGeom>
-          <a:ln w="38100">
-            <a:prstDash val="sysDash"/>
-            <a:headEnd type="triangle" w="med" len="med"/>
-            <a:tailEnd type="none" w="med" len="med"/>
-          </a:ln>
-        </p:spPr>
-        <p:style>
-          <a:lnRef idx="1">
-            <a:schemeClr val="accent2"/>
-          </a:lnRef>
-          <a:fillRef idx="0">
-            <a:schemeClr val="accent2"/>
-          </a:fillRef>
-          <a:effectRef idx="0">
-            <a:schemeClr val="accent2"/>
-          </a:effectRef>
-          <a:fontRef idx="minor">
-            <a:schemeClr val="tx1"/>
-          </a:fontRef>
-        </p:style>
-      </p:cxnSp>
-      <p:pic>
-        <p:nvPicPr>
-          <p:cNvPr id="22" name="Picture 21">
-            <a:extLst>
-              <a:ext uri="{FF2B5EF4-FFF2-40B4-BE49-F238E27FC236}">
-                <a16:creationId xmlns:a16="http://schemas.microsoft.com/office/drawing/2014/main" id="{FAE72A11-79EA-4F19-A261-247B5DB58601}"/>
-              </a:ext>
-            </a:extLst>
-          </p:cNvPr>
-          <p:cNvPicPr>
-            <a:picLocks noChangeAspect="1"/>
-          </p:cNvPicPr>
-          <p:nvPr/>
-        </p:nvPicPr>
-        <p:blipFill>
-          <a:blip r:embed="rId5"/>
-          <a:stretch>
-            <a:fillRect/>
-          </a:stretch>
-        </p:blipFill>
-        <p:spPr>
-          <a:xfrm>
-            <a:off x="1432020" y="4410239"/>
-            <a:ext cx="3943900" cy="1800199"/>
-          </a:xfrm>
-          <a:prstGeom prst="rect">
-            <a:avLst/>
-          </a:prstGeom>
-        </p:spPr>
-      </p:pic>
-      <p:pic>
-        <p:nvPicPr>
-          <p:cNvPr id="23" name="Picture 22">
-            <a:extLst>
-              <a:ext uri="{FF2B5EF4-FFF2-40B4-BE49-F238E27FC236}">
-                <a16:creationId xmlns:a16="http://schemas.microsoft.com/office/drawing/2014/main" id="{ABE277A8-61BF-4E19-ABE5-70C0BF662325}"/>
-              </a:ext>
-            </a:extLst>
-          </p:cNvPr>
-          <p:cNvPicPr>
-            <a:picLocks noChangeAspect="1"/>
-          </p:cNvPicPr>
-          <p:nvPr/>
-        </p:nvPicPr>
-        <p:blipFill>
-          <a:blip r:embed="rId6"/>
-          <a:stretch>
-            <a:fillRect/>
-          </a:stretch>
-        </p:blipFill>
-        <p:spPr>
-          <a:xfrm>
-            <a:off x="6744072" y="4437113"/>
-            <a:ext cx="3888432" cy="1800199"/>
-          </a:xfrm>
-          <a:prstGeom prst="rect">
-            <a:avLst/>
-          </a:prstGeom>
-        </p:spPr>
-      </p:pic>
-      <p:cxnSp>
-        <p:nvCxnSpPr>
-          <p:cNvPr id="24" name="Straight Arrow Connector 23">
-            <a:extLst>
-              <a:ext uri="{FF2B5EF4-FFF2-40B4-BE49-F238E27FC236}">
-                <a16:creationId xmlns:a16="http://schemas.microsoft.com/office/drawing/2014/main" id="{9BCB1F23-0A1F-48FB-91B3-4D80A06934DA}"/>
-              </a:ext>
-            </a:extLst>
-          </p:cNvPr>
-          <p:cNvCxnSpPr>
-            <a:cxnSpLocks/>
-          </p:cNvCxnSpPr>
-          <p:nvPr/>
-        </p:nvCxnSpPr>
-        <p:spPr>
-          <a:xfrm>
-            <a:off x="5399152" y="5445224"/>
-            <a:ext cx="1272912" cy="0"/>
-          </a:xfrm>
-          <a:prstGeom prst="straightConnector1">
-            <a:avLst/>
-          </a:prstGeom>
-          <a:ln w="38100">
-            <a:prstDash val="sysDash"/>
-            <a:headEnd type="triangle" w="med" len="med"/>
-            <a:tailEnd type="none" w="med" len="med"/>
-          </a:ln>
-        </p:spPr>
-        <p:style>
-          <a:lnRef idx="1">
-            <a:schemeClr val="accent2"/>
-          </a:lnRef>
-          <a:fillRef idx="0">
-            <a:schemeClr val="accent2"/>
-          </a:fillRef>
-          <a:effectRef idx="0">
-            <a:schemeClr val="accent2"/>
-          </a:effectRef>
-          <a:fontRef idx="minor">
-            <a:schemeClr val="tx1"/>
-          </a:fontRef>
-        </p:style>
-      </p:cxnSp>
     </p:spTree>
     <p:extLst>
       <p:ext uri="{BB962C8B-B14F-4D97-AF65-F5344CB8AC3E}">
@@ -44101,8 +43535,8 @@
         </p:nvSpPr>
         <p:spPr>
           <a:xfrm>
-            <a:off x="813370" y="260648"/>
-            <a:ext cx="9963150" cy="1152127"/>
+            <a:off x="813370" y="332656"/>
+            <a:ext cx="9963150" cy="1080120"/>
           </a:xfrm>
         </p:spPr>
         <p:txBody>
@@ -44117,49 +43551,17 @@
                   <a:schemeClr val="tx1"/>
                 </a:solidFill>
               </a:rPr>
-              <a:t>service classes  </a:t>
-            </a:r>
-          </a:p>
-        </p:txBody>
-      </p:sp>
-      <p:sp>
-        <p:nvSpPr>
-          <p:cNvPr id="3" name="TextBox 2">
-            <a:extLst>
-              <a:ext uri="{FF2B5EF4-FFF2-40B4-BE49-F238E27FC236}">
-                <a16:creationId xmlns:a16="http://schemas.microsoft.com/office/drawing/2014/main" id="{DBB4057A-80F7-400B-9766-489730D45AA4}"/>
-              </a:ext>
-            </a:extLst>
-          </p:cNvPr>
-          <p:cNvSpPr txBox="1"/>
-          <p:nvPr/>
-        </p:nvSpPr>
-        <p:spPr>
-          <a:xfrm>
-            <a:off x="5471160" y="2646680"/>
-            <a:ext cx="914400" cy="914400"/>
-          </a:xfrm>
-          <a:prstGeom prst="rect">
-            <a:avLst/>
-          </a:prstGeom>
-          <a:noFill/>
-        </p:spPr>
-        <p:txBody>
-          <a:bodyPr wrap="square" rtlCol="0">
-            <a:spAutoFit/>
-          </a:bodyPr>
-          <a:lstStyle/>
-          <a:p>
-            <a:endParaRPr lang="en-IN" dirty="0"/>
+              <a:t>Repository classes  </a:t>
+            </a:r>
           </a:p>
         </p:txBody>
       </p:sp>
       <p:pic>
         <p:nvPicPr>
-          <p:cNvPr id="10" name="Picture 9">
-            <a:extLst>
-              <a:ext uri="{FF2B5EF4-FFF2-40B4-BE49-F238E27FC236}">
-                <a16:creationId xmlns:a16="http://schemas.microsoft.com/office/drawing/2014/main" id="{ABC0214A-0EA9-4BC9-8367-F4280C96A50B}"/>
+          <p:cNvPr id="4" name="Picture 3">
+            <a:extLst>
+              <a:ext uri="{FF2B5EF4-FFF2-40B4-BE49-F238E27FC236}">
+                <a16:creationId xmlns:a16="http://schemas.microsoft.com/office/drawing/2014/main" id="{B670CA7F-D929-4DDD-8E8A-1ADFADC33F19}"/>
               </a:ext>
             </a:extLst>
           </p:cNvPr>
@@ -44176,194 +43578,18 @@
         </p:blipFill>
         <p:spPr>
           <a:xfrm>
-            <a:off x="1432020" y="1328754"/>
-            <a:ext cx="3943900" cy="2043985"/>
+            <a:off x="3359696" y="1844824"/>
+            <a:ext cx="4968552" cy="3960439"/>
           </a:xfrm>
           <a:prstGeom prst="rect">
             <a:avLst/>
           </a:prstGeom>
         </p:spPr>
       </p:pic>
-      <p:pic>
-        <p:nvPicPr>
-          <p:cNvPr id="2" name="Picture 1">
-            <a:extLst>
-              <a:ext uri="{FF2B5EF4-FFF2-40B4-BE49-F238E27FC236}">
-                <a16:creationId xmlns:a16="http://schemas.microsoft.com/office/drawing/2014/main" id="{BD54C980-D401-4091-9A3A-1562D5FCC56A}"/>
-              </a:ext>
-            </a:extLst>
-          </p:cNvPr>
-          <p:cNvPicPr>
-            <a:picLocks noChangeAspect="1"/>
-          </p:cNvPicPr>
-          <p:nvPr/>
-        </p:nvPicPr>
-        <p:blipFill>
-          <a:blip r:embed="rId4"/>
-          <a:stretch>
-            <a:fillRect/>
-          </a:stretch>
-        </p:blipFill>
-        <p:spPr>
-          <a:xfrm>
-            <a:off x="6671310" y="1322002"/>
-            <a:ext cx="4135181" cy="2844889"/>
-          </a:xfrm>
-          <a:prstGeom prst="rect">
-            <a:avLst/>
-          </a:prstGeom>
-        </p:spPr>
-      </p:pic>
-      <p:cxnSp>
-        <p:nvCxnSpPr>
-          <p:cNvPr id="12" name="Straight Arrow Connector 11">
-            <a:extLst>
-              <a:ext uri="{FF2B5EF4-FFF2-40B4-BE49-F238E27FC236}">
-                <a16:creationId xmlns:a16="http://schemas.microsoft.com/office/drawing/2014/main" id="{A6E3A7BE-D005-4396-9A9D-CDF106DCF850}"/>
-              </a:ext>
-            </a:extLst>
-          </p:cNvPr>
-          <p:cNvCxnSpPr>
-            <a:cxnSpLocks/>
-          </p:cNvCxnSpPr>
-          <p:nvPr/>
-        </p:nvCxnSpPr>
-        <p:spPr>
-          <a:xfrm>
-            <a:off x="5375920" y="2492896"/>
-            <a:ext cx="1272912" cy="0"/>
-          </a:xfrm>
-          <a:prstGeom prst="straightConnector1">
-            <a:avLst/>
-          </a:prstGeom>
-          <a:ln w="38100">
-            <a:prstDash val="sysDash"/>
-            <a:headEnd type="triangle" w="med" len="med"/>
-            <a:tailEnd type="none" w="med" len="med"/>
-          </a:ln>
-        </p:spPr>
-        <p:style>
-          <a:lnRef idx="1">
-            <a:schemeClr val="accent2"/>
-          </a:lnRef>
-          <a:fillRef idx="0">
-            <a:schemeClr val="accent2"/>
-          </a:fillRef>
-          <a:effectRef idx="0">
-            <a:schemeClr val="accent2"/>
-          </a:effectRef>
-          <a:fontRef idx="minor">
-            <a:schemeClr val="tx1"/>
-          </a:fontRef>
-        </p:style>
-      </p:cxnSp>
-      <p:pic>
-        <p:nvPicPr>
-          <p:cNvPr id="6" name="Picture 5">
-            <a:extLst>
-              <a:ext uri="{FF2B5EF4-FFF2-40B4-BE49-F238E27FC236}">
-                <a16:creationId xmlns:a16="http://schemas.microsoft.com/office/drawing/2014/main" id="{FD475174-A461-449A-9E21-68476556EB3A}"/>
-              </a:ext>
-            </a:extLst>
-          </p:cNvPr>
-          <p:cNvPicPr>
-            <a:picLocks noChangeAspect="1"/>
-          </p:cNvPicPr>
-          <p:nvPr/>
-        </p:nvPicPr>
-        <p:blipFill>
-          <a:blip r:embed="rId5"/>
-          <a:stretch>
-            <a:fillRect/>
-          </a:stretch>
-        </p:blipFill>
-        <p:spPr>
-          <a:xfrm>
-            <a:off x="1487488" y="4365104"/>
-            <a:ext cx="3888432" cy="1296144"/>
-          </a:xfrm>
-          <a:prstGeom prst="rect">
-            <a:avLst/>
-          </a:prstGeom>
-        </p:spPr>
-      </p:pic>
-      <p:pic>
-        <p:nvPicPr>
-          <p:cNvPr id="7" name="Picture 6">
-            <a:extLst>
-              <a:ext uri="{FF2B5EF4-FFF2-40B4-BE49-F238E27FC236}">
-                <a16:creationId xmlns:a16="http://schemas.microsoft.com/office/drawing/2014/main" id="{5BDE4203-74B8-4EF3-94F1-0263C02FF8BE}"/>
-              </a:ext>
-            </a:extLst>
-          </p:cNvPr>
-          <p:cNvPicPr>
-            <a:picLocks noChangeAspect="1"/>
-          </p:cNvPicPr>
-          <p:nvPr/>
-        </p:nvPicPr>
-        <p:blipFill>
-          <a:blip r:embed="rId6"/>
-          <a:stretch>
-            <a:fillRect/>
-          </a:stretch>
-        </p:blipFill>
-        <p:spPr>
-          <a:xfrm>
-            <a:off x="6671310" y="4293097"/>
-            <a:ext cx="4105210" cy="2048322"/>
-          </a:xfrm>
-          <a:prstGeom prst="rect">
-            <a:avLst/>
-          </a:prstGeom>
-        </p:spPr>
-      </p:pic>
-      <p:cxnSp>
-        <p:nvCxnSpPr>
-          <p:cNvPr id="17" name="Straight Arrow Connector 16">
-            <a:extLst>
-              <a:ext uri="{FF2B5EF4-FFF2-40B4-BE49-F238E27FC236}">
-                <a16:creationId xmlns:a16="http://schemas.microsoft.com/office/drawing/2014/main" id="{38F6343A-157F-4044-AB29-DB92D0A8E59B}"/>
-              </a:ext>
-            </a:extLst>
-          </p:cNvPr>
-          <p:cNvCxnSpPr>
-            <a:cxnSpLocks/>
-          </p:cNvCxnSpPr>
-          <p:nvPr/>
-        </p:nvCxnSpPr>
-        <p:spPr>
-          <a:xfrm>
-            <a:off x="5375920" y="5085184"/>
-            <a:ext cx="1272912" cy="0"/>
-          </a:xfrm>
-          <a:prstGeom prst="straightConnector1">
-            <a:avLst/>
-          </a:prstGeom>
-          <a:ln w="38100">
-            <a:prstDash val="sysDash"/>
-            <a:headEnd type="triangle" w="med" len="med"/>
-            <a:tailEnd type="none" w="med" len="med"/>
-          </a:ln>
-        </p:spPr>
-        <p:style>
-          <a:lnRef idx="1">
-            <a:schemeClr val="accent2"/>
-          </a:lnRef>
-          <a:fillRef idx="0">
-            <a:schemeClr val="accent2"/>
-          </a:fillRef>
-          <a:effectRef idx="0">
-            <a:schemeClr val="accent2"/>
-          </a:effectRef>
-          <a:fontRef idx="minor">
-            <a:schemeClr val="tx1"/>
-          </a:fontRef>
-        </p:style>
-      </p:cxnSp>
     </p:spTree>
     <p:extLst>
       <p:ext uri="{BB962C8B-B14F-4D97-AF65-F5344CB8AC3E}">
-        <p14:creationId xmlns:p14="http://schemas.microsoft.com/office/powerpoint/2010/main" val="604676040"/>
+        <p14:creationId xmlns:p14="http://schemas.microsoft.com/office/powerpoint/2010/main" val="3951214977"/>
       </p:ext>
     </p:extLst>
   </p:cSld>
@@ -44392,21 +43618,18 @@
       </p:grpSpPr>
       <p:sp>
         <p:nvSpPr>
-          <p:cNvPr id="15" name="Text Placeholder 14">
-            <a:extLst>
-              <a:ext uri="{FF2B5EF4-FFF2-40B4-BE49-F238E27FC236}">
-                <a16:creationId xmlns:a16="http://schemas.microsoft.com/office/drawing/2014/main" id="{A682397A-D234-4487-8E63-23B79C769633}"/>
-              </a:ext>
-              <a:ext uri="{C183D7F6-B498-43B3-948B-1728B52AA6E4}">
-                <adec:decorative xmlns:adec="http://schemas.microsoft.com/office/drawing/2017/decorative" val="1"/>
-              </a:ext>
-            </a:extLst>
-          </p:cNvPr>
-          <p:cNvSpPr>
-            <a:spLocks noGrp="1"/>
-          </p:cNvSpPr>
-          <p:nvPr>
-            <p:ph type="body" sz="quarter" idx="13"/>
+          <p:cNvPr id="12" name="Title 11">
+            <a:extLst>
+              <a:ext uri="{FF2B5EF4-FFF2-40B4-BE49-F238E27FC236}">
+                <a16:creationId xmlns:a16="http://schemas.microsoft.com/office/drawing/2014/main" id="{94C582A2-A406-4C9B-A3DA-BA4EECAB37AC}"/>
+              </a:ext>
+            </a:extLst>
+          </p:cNvPr>
+          <p:cNvSpPr>
+            <a:spLocks noGrp="1"/>
+          </p:cNvSpPr>
+          <p:nvPr>
+            <p:ph type="title"/>
           </p:nvPr>
         </p:nvSpPr>
         <p:spPr/>
@@ -44414,30 +43637,33 @@
           <a:bodyPr/>
           <a:lstStyle/>
           <a:p>
-            <a:endParaRPr lang="en-US" dirty="0"/>
-          </a:p>
-        </p:txBody>
-      </p:sp>
-      <p:sp>
-        <p:nvSpPr>
-          <p:cNvPr id="13" name="Title 12">
-            <a:extLst>
-              <a:ext uri="{FF2B5EF4-FFF2-40B4-BE49-F238E27FC236}">
-                <a16:creationId xmlns:a16="http://schemas.microsoft.com/office/drawing/2014/main" id="{D7199992-58FE-4335-A811-6AFA96B5595D}"/>
-              </a:ext>
-            </a:extLst>
-          </p:cNvPr>
-          <p:cNvSpPr>
-            <a:spLocks noGrp="1"/>
-          </p:cNvSpPr>
-          <p:nvPr>
-            <p:ph type="title"/>
-          </p:nvPr>
-        </p:nvSpPr>
-        <p:spPr>
-          <a:xfrm>
-            <a:off x="813370" y="260088"/>
-            <a:ext cx="9963150" cy="1152687"/>
+            <a:r>
+              <a:rPr lang="en-US" dirty="0"/>
+              <a:t>Conclusion</a:t>
+            </a:r>
+          </a:p>
+        </p:txBody>
+      </p:sp>
+      <p:sp>
+        <p:nvSpPr>
+          <p:cNvPr id="13" name="Content Placeholder 12">
+            <a:extLst>
+              <a:ext uri="{FF2B5EF4-FFF2-40B4-BE49-F238E27FC236}">
+                <a16:creationId xmlns:a16="http://schemas.microsoft.com/office/drawing/2014/main" id="{556610ED-3E2D-4E6A-ABD0-150F203E6B46}"/>
+              </a:ext>
+            </a:extLst>
+          </p:cNvPr>
+          <p:cNvSpPr>
+            <a:spLocks noGrp="1"/>
+          </p:cNvSpPr>
+          <p:nvPr>
+            <p:ph sz="quarter" idx="13"/>
+          </p:nvPr>
+        </p:nvSpPr>
+        <p:spPr>
+          <a:xfrm>
+            <a:off x="548640" y="2231886"/>
+            <a:ext cx="10288693" cy="4095762"/>
           </a:xfrm>
         </p:spPr>
         <p:txBody>
@@ -44446,485 +43672,6 @@
           </a:bodyPr>
           <a:lstStyle/>
           <a:p>
-            <a:r>
-              <a:rPr lang="en-US" sz="4800" dirty="0">
-                <a:solidFill>
-                  <a:schemeClr val="tx1"/>
-                </a:solidFill>
-              </a:rPr>
-              <a:t>service classes  </a:t>
-            </a:r>
-          </a:p>
-        </p:txBody>
-      </p:sp>
-      <p:sp>
-        <p:nvSpPr>
-          <p:cNvPr id="3" name="TextBox 2">
-            <a:extLst>
-              <a:ext uri="{FF2B5EF4-FFF2-40B4-BE49-F238E27FC236}">
-                <a16:creationId xmlns:a16="http://schemas.microsoft.com/office/drawing/2014/main" id="{DBB4057A-80F7-400B-9766-489730D45AA4}"/>
-              </a:ext>
-            </a:extLst>
-          </p:cNvPr>
-          <p:cNvSpPr txBox="1"/>
-          <p:nvPr/>
-        </p:nvSpPr>
-        <p:spPr>
-          <a:xfrm>
-            <a:off x="5471160" y="2646680"/>
-            <a:ext cx="914400" cy="914400"/>
-          </a:xfrm>
-          <a:prstGeom prst="rect">
-            <a:avLst/>
-          </a:prstGeom>
-          <a:noFill/>
-        </p:spPr>
-        <p:txBody>
-          <a:bodyPr wrap="square" rtlCol="0">
-            <a:spAutoFit/>
-          </a:bodyPr>
-          <a:lstStyle/>
-          <a:p>
-            <a:endParaRPr lang="en-IN" dirty="0"/>
-          </a:p>
-        </p:txBody>
-      </p:sp>
-      <p:pic>
-        <p:nvPicPr>
-          <p:cNvPr id="2" name="Picture 1">
-            <a:extLst>
-              <a:ext uri="{FF2B5EF4-FFF2-40B4-BE49-F238E27FC236}">
-                <a16:creationId xmlns:a16="http://schemas.microsoft.com/office/drawing/2014/main" id="{2B1A9F70-72AF-42AF-BF3F-38AC781EED6E}"/>
-              </a:ext>
-            </a:extLst>
-          </p:cNvPr>
-          <p:cNvPicPr>
-            <a:picLocks noChangeAspect="1"/>
-          </p:cNvPicPr>
-          <p:nvPr/>
-        </p:nvPicPr>
-        <p:blipFill>
-          <a:blip r:embed="rId3"/>
-          <a:stretch>
-            <a:fillRect/>
-          </a:stretch>
-        </p:blipFill>
-        <p:spPr>
-          <a:xfrm>
-            <a:off x="2251284" y="2564346"/>
-            <a:ext cx="3124636" cy="1152686"/>
-          </a:xfrm>
-          <a:prstGeom prst="rect">
-            <a:avLst/>
-          </a:prstGeom>
-        </p:spPr>
-      </p:pic>
-      <p:pic>
-        <p:nvPicPr>
-          <p:cNvPr id="6" name="Picture 5">
-            <a:extLst>
-              <a:ext uri="{FF2B5EF4-FFF2-40B4-BE49-F238E27FC236}">
-                <a16:creationId xmlns:a16="http://schemas.microsoft.com/office/drawing/2014/main" id="{A2538736-C29F-4BD8-A11E-55AA73CC8FC1}"/>
-              </a:ext>
-            </a:extLst>
-          </p:cNvPr>
-          <p:cNvPicPr>
-            <a:picLocks noChangeAspect="1"/>
-          </p:cNvPicPr>
-          <p:nvPr/>
-        </p:nvPicPr>
-        <p:blipFill>
-          <a:blip r:embed="rId4"/>
-          <a:stretch>
-            <a:fillRect/>
-          </a:stretch>
-        </p:blipFill>
-        <p:spPr>
-          <a:xfrm>
-            <a:off x="6672064" y="2536049"/>
-            <a:ext cx="3248478" cy="1829055"/>
-          </a:xfrm>
-          <a:prstGeom prst="rect">
-            <a:avLst/>
-          </a:prstGeom>
-        </p:spPr>
-      </p:pic>
-      <p:cxnSp>
-        <p:nvCxnSpPr>
-          <p:cNvPr id="12" name="Straight Arrow Connector 11">
-            <a:extLst>
-              <a:ext uri="{FF2B5EF4-FFF2-40B4-BE49-F238E27FC236}">
-                <a16:creationId xmlns:a16="http://schemas.microsoft.com/office/drawing/2014/main" id="{A1907644-730D-4FA7-8112-694FCA974003}"/>
-              </a:ext>
-            </a:extLst>
-          </p:cNvPr>
-          <p:cNvCxnSpPr>
-            <a:cxnSpLocks/>
-          </p:cNvCxnSpPr>
-          <p:nvPr/>
-        </p:nvCxnSpPr>
-        <p:spPr>
-          <a:xfrm>
-            <a:off x="5375920" y="3140968"/>
-            <a:ext cx="1272912" cy="0"/>
-          </a:xfrm>
-          <a:prstGeom prst="straightConnector1">
-            <a:avLst/>
-          </a:prstGeom>
-          <a:ln w="38100">
-            <a:prstDash val="sysDash"/>
-            <a:headEnd type="triangle" w="med" len="med"/>
-            <a:tailEnd type="none" w="med" len="med"/>
-          </a:ln>
-        </p:spPr>
-        <p:style>
-          <a:lnRef idx="1">
-            <a:schemeClr val="accent2"/>
-          </a:lnRef>
-          <a:fillRef idx="0">
-            <a:schemeClr val="accent2"/>
-          </a:fillRef>
-          <a:effectRef idx="0">
-            <a:schemeClr val="accent2"/>
-          </a:effectRef>
-          <a:fontRef idx="minor">
-            <a:schemeClr val="tx1"/>
-          </a:fontRef>
-        </p:style>
-      </p:cxnSp>
-    </p:spTree>
-    <p:extLst>
-      <p:ext uri="{BB962C8B-B14F-4D97-AF65-F5344CB8AC3E}">
-        <p14:creationId xmlns:p14="http://schemas.microsoft.com/office/powerpoint/2010/main" val="2311993402"/>
-      </p:ext>
-    </p:extLst>
-  </p:cSld>
-  <p:clrMapOvr>
-    <a:masterClrMapping/>
-  </p:clrMapOvr>
-</p:sld>
-</file>
-
-<file path=ppt/slides/slide16.xml><?xml version="1.0" encoding="utf-8"?>
-<p:sld xmlns:a="http://schemas.openxmlformats.org/drawingml/2006/main" xmlns:r="http://schemas.openxmlformats.org/officeDocument/2006/relationships" xmlns:p="http://schemas.openxmlformats.org/presentationml/2006/main">
-  <p:cSld>
-    <p:spTree>
-      <p:nvGrpSpPr>
-        <p:cNvPr id="1" name=""/>
-        <p:cNvGrpSpPr/>
-        <p:nvPr/>
-      </p:nvGrpSpPr>
-      <p:grpSpPr>
-        <a:xfrm>
-          <a:off x="0" y="0"/>
-          <a:ext cx="0" cy="0"/>
-          <a:chOff x="0" y="0"/>
-          <a:chExt cx="0" cy="0"/>
-        </a:xfrm>
-      </p:grpSpPr>
-      <p:sp>
-        <p:nvSpPr>
-          <p:cNvPr id="15" name="Text Placeholder 14">
-            <a:extLst>
-              <a:ext uri="{FF2B5EF4-FFF2-40B4-BE49-F238E27FC236}">
-                <a16:creationId xmlns:a16="http://schemas.microsoft.com/office/drawing/2014/main" id="{A682397A-D234-4487-8E63-23B79C769633}"/>
-              </a:ext>
-              <a:ext uri="{C183D7F6-B498-43B3-948B-1728B52AA6E4}">
-                <adec:decorative xmlns:adec="http://schemas.microsoft.com/office/drawing/2017/decorative" val="1"/>
-              </a:ext>
-            </a:extLst>
-          </p:cNvPr>
-          <p:cNvSpPr>
-            <a:spLocks noGrp="1"/>
-          </p:cNvSpPr>
-          <p:nvPr>
-            <p:ph type="body" sz="quarter" idx="13"/>
-          </p:nvPr>
-        </p:nvSpPr>
-        <p:spPr/>
-        <p:txBody>
-          <a:bodyPr/>
-          <a:lstStyle/>
-          <a:p>
-            <a:endParaRPr lang="en-US" dirty="0"/>
-          </a:p>
-        </p:txBody>
-      </p:sp>
-      <p:sp>
-        <p:nvSpPr>
-          <p:cNvPr id="13" name="Title 12">
-            <a:extLst>
-              <a:ext uri="{FF2B5EF4-FFF2-40B4-BE49-F238E27FC236}">
-                <a16:creationId xmlns:a16="http://schemas.microsoft.com/office/drawing/2014/main" id="{D7199992-58FE-4335-A811-6AFA96B5595D}"/>
-              </a:ext>
-            </a:extLst>
-          </p:cNvPr>
-          <p:cNvSpPr>
-            <a:spLocks noGrp="1"/>
-          </p:cNvSpPr>
-          <p:nvPr>
-            <p:ph type="title"/>
-          </p:nvPr>
-        </p:nvSpPr>
-        <p:spPr>
-          <a:xfrm>
-            <a:off x="813370" y="332656"/>
-            <a:ext cx="9963150" cy="1080120"/>
-          </a:xfrm>
-        </p:spPr>
-        <p:txBody>
-          <a:bodyPr>
-            <a:normAutofit/>
-          </a:bodyPr>
-          <a:lstStyle/>
-          <a:p>
-            <a:r>
-              <a:rPr lang="en-US" sz="4800" dirty="0">
-                <a:solidFill>
-                  <a:schemeClr val="tx1"/>
-                </a:solidFill>
-              </a:rPr>
-              <a:t>Repository classes  </a:t>
-            </a:r>
-          </a:p>
-        </p:txBody>
-      </p:sp>
-      <p:pic>
-        <p:nvPicPr>
-          <p:cNvPr id="2" name="Picture 1">
-            <a:extLst>
-              <a:ext uri="{FF2B5EF4-FFF2-40B4-BE49-F238E27FC236}">
-                <a16:creationId xmlns:a16="http://schemas.microsoft.com/office/drawing/2014/main" id="{C8B83640-85E2-4529-AEB3-05A9595BF05D}"/>
-              </a:ext>
-            </a:extLst>
-          </p:cNvPr>
-          <p:cNvPicPr>
-            <a:picLocks noChangeAspect="1"/>
-          </p:cNvPicPr>
-          <p:nvPr/>
-        </p:nvPicPr>
-        <p:blipFill>
-          <a:blip r:embed="rId3"/>
-          <a:stretch>
-            <a:fillRect/>
-          </a:stretch>
-        </p:blipFill>
-        <p:spPr>
-          <a:xfrm>
-            <a:off x="1142908" y="2295277"/>
-            <a:ext cx="2889115" cy="914400"/>
-          </a:xfrm>
-          <a:prstGeom prst="rect">
-            <a:avLst/>
-          </a:prstGeom>
-        </p:spPr>
-      </p:pic>
-      <p:pic>
-        <p:nvPicPr>
-          <p:cNvPr id="8" name="Picture 7">
-            <a:extLst>
-              <a:ext uri="{FF2B5EF4-FFF2-40B4-BE49-F238E27FC236}">
-                <a16:creationId xmlns:a16="http://schemas.microsoft.com/office/drawing/2014/main" id="{DF84D153-DE2D-482E-BE9B-185FFCD3D72C}"/>
-              </a:ext>
-            </a:extLst>
-          </p:cNvPr>
-          <p:cNvPicPr>
-            <a:picLocks noChangeAspect="1"/>
-          </p:cNvPicPr>
-          <p:nvPr/>
-        </p:nvPicPr>
-        <p:blipFill>
-          <a:blip r:embed="rId4"/>
-          <a:stretch>
-            <a:fillRect/>
-          </a:stretch>
-        </p:blipFill>
-        <p:spPr>
-          <a:xfrm>
-            <a:off x="4902005" y="2295277"/>
-            <a:ext cx="2792361" cy="914400"/>
-          </a:xfrm>
-          <a:prstGeom prst="rect">
-            <a:avLst/>
-          </a:prstGeom>
-        </p:spPr>
-      </p:pic>
-      <p:pic>
-        <p:nvPicPr>
-          <p:cNvPr id="9" name="Picture 8">
-            <a:extLst>
-              <a:ext uri="{FF2B5EF4-FFF2-40B4-BE49-F238E27FC236}">
-                <a16:creationId xmlns:a16="http://schemas.microsoft.com/office/drawing/2014/main" id="{9AF0198D-F525-4FB1-9C33-1637E8C8671A}"/>
-              </a:ext>
-            </a:extLst>
-          </p:cNvPr>
-          <p:cNvPicPr>
-            <a:picLocks noChangeAspect="1"/>
-          </p:cNvPicPr>
-          <p:nvPr/>
-        </p:nvPicPr>
-        <p:blipFill>
-          <a:blip r:embed="rId5"/>
-          <a:stretch>
-            <a:fillRect/>
-          </a:stretch>
-        </p:blipFill>
-        <p:spPr>
-          <a:xfrm>
-            <a:off x="8564348" y="2315487"/>
-            <a:ext cx="2665378" cy="914400"/>
-          </a:xfrm>
-          <a:prstGeom prst="rect">
-            <a:avLst/>
-          </a:prstGeom>
-        </p:spPr>
-      </p:pic>
-      <p:pic>
-        <p:nvPicPr>
-          <p:cNvPr id="10" name="Picture 9">
-            <a:extLst>
-              <a:ext uri="{FF2B5EF4-FFF2-40B4-BE49-F238E27FC236}">
-                <a16:creationId xmlns:a16="http://schemas.microsoft.com/office/drawing/2014/main" id="{482E3251-B464-40B1-B066-CCB5EFBB3427}"/>
-              </a:ext>
-            </a:extLst>
-          </p:cNvPr>
-          <p:cNvPicPr>
-            <a:picLocks noChangeAspect="1"/>
-          </p:cNvPicPr>
-          <p:nvPr/>
-        </p:nvPicPr>
-        <p:blipFill>
-          <a:blip r:embed="rId6"/>
-          <a:stretch>
-            <a:fillRect/>
-          </a:stretch>
-        </p:blipFill>
-        <p:spPr>
-          <a:xfrm>
-            <a:off x="2629474" y="3983704"/>
-            <a:ext cx="2805097" cy="719798"/>
-          </a:xfrm>
-          <a:prstGeom prst="rect">
-            <a:avLst/>
-          </a:prstGeom>
-        </p:spPr>
-      </p:pic>
-      <p:pic>
-        <p:nvPicPr>
-          <p:cNvPr id="12" name="Picture 11">
-            <a:extLst>
-              <a:ext uri="{FF2B5EF4-FFF2-40B4-BE49-F238E27FC236}">
-                <a16:creationId xmlns:a16="http://schemas.microsoft.com/office/drawing/2014/main" id="{82F91067-2392-4F3C-9CAB-EA0A48E2D272}"/>
-              </a:ext>
-            </a:extLst>
-          </p:cNvPr>
-          <p:cNvPicPr>
-            <a:picLocks noChangeAspect="1"/>
-          </p:cNvPicPr>
-          <p:nvPr/>
-        </p:nvPicPr>
-        <p:blipFill>
-          <a:blip r:embed="rId7"/>
-          <a:stretch>
-            <a:fillRect/>
-          </a:stretch>
-        </p:blipFill>
-        <p:spPr>
-          <a:xfrm>
-            <a:off x="6600056" y="3986752"/>
-            <a:ext cx="2665378" cy="719798"/>
-          </a:xfrm>
-          <a:prstGeom prst="rect">
-            <a:avLst/>
-          </a:prstGeom>
-        </p:spPr>
-      </p:pic>
-    </p:spTree>
-    <p:extLst>
-      <p:ext uri="{BB962C8B-B14F-4D97-AF65-F5344CB8AC3E}">
-        <p14:creationId xmlns:p14="http://schemas.microsoft.com/office/powerpoint/2010/main" val="3951214977"/>
-      </p:ext>
-    </p:extLst>
-  </p:cSld>
-  <p:clrMapOvr>
-    <a:masterClrMapping/>
-  </p:clrMapOvr>
-</p:sld>
-</file>
-
-<file path=ppt/slides/slide17.xml><?xml version="1.0" encoding="utf-8"?>
-<p:sld xmlns:a="http://schemas.openxmlformats.org/drawingml/2006/main" xmlns:r="http://schemas.openxmlformats.org/officeDocument/2006/relationships" xmlns:p="http://schemas.openxmlformats.org/presentationml/2006/main">
-  <p:cSld>
-    <p:spTree>
-      <p:nvGrpSpPr>
-        <p:cNvPr id="1" name=""/>
-        <p:cNvGrpSpPr/>
-        <p:nvPr/>
-      </p:nvGrpSpPr>
-      <p:grpSpPr>
-        <a:xfrm>
-          <a:off x="0" y="0"/>
-          <a:ext cx="0" cy="0"/>
-          <a:chOff x="0" y="0"/>
-          <a:chExt cx="0" cy="0"/>
-        </a:xfrm>
-      </p:grpSpPr>
-      <p:sp>
-        <p:nvSpPr>
-          <p:cNvPr id="12" name="Title 11">
-            <a:extLst>
-              <a:ext uri="{FF2B5EF4-FFF2-40B4-BE49-F238E27FC236}">
-                <a16:creationId xmlns:a16="http://schemas.microsoft.com/office/drawing/2014/main" id="{94C582A2-A406-4C9B-A3DA-BA4EECAB37AC}"/>
-              </a:ext>
-            </a:extLst>
-          </p:cNvPr>
-          <p:cNvSpPr>
-            <a:spLocks noGrp="1"/>
-          </p:cNvSpPr>
-          <p:nvPr>
-            <p:ph type="title"/>
-          </p:nvPr>
-        </p:nvSpPr>
-        <p:spPr/>
-        <p:txBody>
-          <a:bodyPr/>
-          <a:lstStyle/>
-          <a:p>
-            <a:r>
-              <a:rPr lang="en-US" dirty="0"/>
-              <a:t>Conclusion</a:t>
-            </a:r>
-          </a:p>
-        </p:txBody>
-      </p:sp>
-      <p:sp>
-        <p:nvSpPr>
-          <p:cNvPr id="13" name="Content Placeholder 12">
-            <a:extLst>
-              <a:ext uri="{FF2B5EF4-FFF2-40B4-BE49-F238E27FC236}">
-                <a16:creationId xmlns:a16="http://schemas.microsoft.com/office/drawing/2014/main" id="{556610ED-3E2D-4E6A-ABD0-150F203E6B46}"/>
-              </a:ext>
-            </a:extLst>
-          </p:cNvPr>
-          <p:cNvSpPr>
-            <a:spLocks noGrp="1"/>
-          </p:cNvSpPr>
-          <p:nvPr>
-            <p:ph sz="quarter" idx="13"/>
-          </p:nvPr>
-        </p:nvSpPr>
-        <p:spPr>
-          <a:xfrm>
-            <a:off x="548640" y="2231886"/>
-            <a:ext cx="10288693" cy="4095762"/>
-          </a:xfrm>
-        </p:spPr>
-        <p:txBody>
-          <a:bodyPr>
-            <a:normAutofit/>
-          </a:bodyPr>
-          <a:lstStyle/>
-          <a:p>
             <a:pPr marL="0" indent="0" algn="just">
               <a:buNone/>
             </a:pPr>
@@ -44956,7 +43703,7 @@
             <a:fld id="{4FAB73BC-B049-4115-A692-8D63A059BFB8}" type="slidenum">
               <a:rPr lang="en-US" smtClean="0"/>
               <a:pPr/>
-              <a:t>17</a:t>
+              <a:t>15</a:t>
             </a:fld>
             <a:endParaRPr lang="en-US" dirty="0"/>
           </a:p>
@@ -50436,12 +49183,12 @@
 </file>
 
 <file path=customXml/item1.xml><?xml version="1.0" encoding="utf-8"?>
-<p:properties xmlns:p="http://schemas.microsoft.com/office/2006/metadata/properties" xmlns:xsi="http://www.w3.org/2001/XMLSchema-instance" xmlns:pc="http://schemas.microsoft.com/office/infopath/2007/PartnerControls">
-  <documentManagement>
-    <Status xmlns="71af3243-3dd4-4a8d-8c0d-dd76da1f02a5">Not started</Status>
-    <MediaServiceKeyPoints xmlns="71af3243-3dd4-4a8d-8c0d-dd76da1f02a5" xsi:nil="true"/>
-  </documentManagement>
-</p:properties>
+<?mso-contentType ?>
+<FormTemplates xmlns="http://schemas.microsoft.com/sharepoint/v3/contenttype/forms">
+  <Display>DocumentLibraryForm</Display>
+  <Edit>DocumentLibraryForm</Edit>
+  <New>DocumentLibraryForm</New>
+</FormTemplates>
 </file>
 
 <file path=customXml/item2.xml><?xml version="1.0" encoding="utf-8"?>
@@ -50666,27 +49413,18 @@
 </file>
 
 <file path=customXml/item3.xml><?xml version="1.0" encoding="utf-8"?>
-<?mso-contentType ?>
-<FormTemplates xmlns="http://schemas.microsoft.com/sharepoint/v3/contenttype/forms">
-  <Display>DocumentLibraryForm</Display>
-  <Edit>DocumentLibraryForm</Edit>
-  <New>DocumentLibraryForm</New>
-</FormTemplates>
+<p:properties xmlns:p="http://schemas.microsoft.com/office/2006/metadata/properties" xmlns:xsi="http://www.w3.org/2001/XMLSchema-instance" xmlns:pc="http://schemas.microsoft.com/office/infopath/2007/PartnerControls">
+  <documentManagement>
+    <Status xmlns="71af3243-3dd4-4a8d-8c0d-dd76da1f02a5">Not started</Status>
+    <MediaServiceKeyPoints xmlns="71af3243-3dd4-4a8d-8c0d-dd76da1f02a5" xsi:nil="true"/>
+  </documentManagement>
+</p:properties>
 </file>
 
 <file path=customXml/itemProps1.xml><?xml version="1.0" encoding="utf-8"?>
-<ds:datastoreItem xmlns:ds="http://schemas.openxmlformats.org/officeDocument/2006/customXml" ds:itemID="{6A86D9CC-0D9D-4BFE-B3F3-26F480BF8C8A}">
+<ds:datastoreItem xmlns:ds="http://schemas.openxmlformats.org/officeDocument/2006/customXml" ds:itemID="{8106BD98-E608-40A1-98A8-93D5976215CA}">
   <ds:schemaRefs>
-    <ds:schemaRef ds:uri="http://purl.org/dc/elements/1.1/"/>
-    <ds:schemaRef ds:uri="71af3243-3dd4-4a8d-8c0d-dd76da1f02a5"/>
-    <ds:schemaRef ds:uri="http://purl.org/dc/dcmitype/"/>
-    <ds:schemaRef ds:uri="http://purl.org/dc/terms/"/>
-    <ds:schemaRef ds:uri="http://schemas.microsoft.com/office/2006/documentManagement/types"/>
-    <ds:schemaRef ds:uri="http://schemas.microsoft.com/office/2006/metadata/properties"/>
-    <ds:schemaRef ds:uri="16c05727-aa75-4e4a-9b5f-8a80a1165891"/>
-    <ds:schemaRef ds:uri="http://schemas.microsoft.com/office/infopath/2007/PartnerControls"/>
-    <ds:schemaRef ds:uri="http://schemas.openxmlformats.org/package/2006/metadata/core-properties"/>
-    <ds:schemaRef ds:uri="http://www.w3.org/XML/1998/namespace"/>
+    <ds:schemaRef ds:uri="http://schemas.microsoft.com/sharepoint/v3/contenttype/forms"/>
   </ds:schemaRefs>
 </ds:datastoreItem>
 </file>
@@ -50711,9 +49449,18 @@
 </file>
 
 <file path=customXml/itemProps3.xml><?xml version="1.0" encoding="utf-8"?>
-<ds:datastoreItem xmlns:ds="http://schemas.openxmlformats.org/officeDocument/2006/customXml" ds:itemID="{8106BD98-E608-40A1-98A8-93D5976215CA}">
+<ds:datastoreItem xmlns:ds="http://schemas.openxmlformats.org/officeDocument/2006/customXml" ds:itemID="{6A86D9CC-0D9D-4BFE-B3F3-26F480BF8C8A}">
   <ds:schemaRefs>
-    <ds:schemaRef ds:uri="http://schemas.microsoft.com/sharepoint/v3/contenttype/forms"/>
+    <ds:schemaRef ds:uri="http://purl.org/dc/elements/1.1/"/>
+    <ds:schemaRef ds:uri="71af3243-3dd4-4a8d-8c0d-dd76da1f02a5"/>
+    <ds:schemaRef ds:uri="http://purl.org/dc/dcmitype/"/>
+    <ds:schemaRef ds:uri="http://purl.org/dc/terms/"/>
+    <ds:schemaRef ds:uri="http://schemas.microsoft.com/office/2006/documentManagement/types"/>
+    <ds:schemaRef ds:uri="http://schemas.microsoft.com/office/2006/metadata/properties"/>
+    <ds:schemaRef ds:uri="16c05727-aa75-4e4a-9b5f-8a80a1165891"/>
+    <ds:schemaRef ds:uri="http://schemas.microsoft.com/office/infopath/2007/PartnerControls"/>
+    <ds:schemaRef ds:uri="http://schemas.openxmlformats.org/package/2006/metadata/core-properties"/>
+    <ds:schemaRef ds:uri="http://www.w3.org/XML/1998/namespace"/>
   </ds:schemaRefs>
 </ds:datastoreItem>
 </file>
</xml_diff>

<commit_message>
fix: change ppt page
</commit_message>
<xml_diff>
--- a/e-commerce-case-study/ecommerce_ppt.pptx
+++ b/e-commerce-case-study/ecommerce_ppt.pptx
@@ -25,7 +25,7 @@
     <p:sldId id="319" r:id="rId16"/>
     <p:sldId id="320" r:id="rId17"/>
     <p:sldId id="321" r:id="rId18"/>
-    <p:sldId id="327" r:id="rId19"/>
+    <p:sldId id="331" r:id="rId19"/>
   </p:sldIdLst>
   <p:sldSz cx="12192000" cy="6858000"/>
   <p:notesSz cx="6858000" cy="9144000"/>
@@ -6412,7 +6412,7 @@
               <a:rPr lang="en-US" smtClean="0">
                 <a:latin typeface="Tw Cen MT" panose="020B0602020104020603" pitchFamily="34" charset="0"/>
               </a:rPr>
-              <a:t>11/16/2022</a:t>
+              <a:t>11/17/2022</a:t>
             </a:fld>
             <a:endParaRPr lang="en-US" dirty="0">
               <a:latin typeface="Tw Cen MT" panose="020B0602020104020603" pitchFamily="34" charset="0"/>
@@ -6602,7 +6602,7 @@
             <a:fld id="{AF4A386A-BFE4-4655-9801-CBB04655F27A}" type="datetimeFigureOut">
               <a:rPr lang="en-US" noProof="0" smtClean="0"/>
               <a:pPr/>
-              <a:t>11/16/2022</a:t>
+              <a:t>11/17/2022</a:t>
             </a:fld>
             <a:endParaRPr lang="en-US" noProof="0" dirty="0"/>
           </a:p>
@@ -7214,91 +7214,6 @@
 </p:notes>
 </file>
 
-<file path=ppt/notesSlides/notesSlide13.xml><?xml version="1.0" encoding="utf-8"?>
-<p:notes xmlns:a="http://schemas.openxmlformats.org/drawingml/2006/main" xmlns:r="http://schemas.openxmlformats.org/officeDocument/2006/relationships" xmlns:p="http://schemas.openxmlformats.org/presentationml/2006/main">
-  <p:cSld>
-    <p:spTree>
-      <p:nvGrpSpPr>
-        <p:cNvPr id="1" name=""/>
-        <p:cNvGrpSpPr/>
-        <p:nvPr/>
-      </p:nvGrpSpPr>
-      <p:grpSpPr>
-        <a:xfrm>
-          <a:off x="0" y="0"/>
-          <a:ext cx="0" cy="0"/>
-          <a:chOff x="0" y="0"/>
-          <a:chExt cx="0" cy="0"/>
-        </a:xfrm>
-      </p:grpSpPr>
-      <p:sp>
-        <p:nvSpPr>
-          <p:cNvPr id="2" name="Slide Image Placeholder 1"/>
-          <p:cNvSpPr>
-            <a:spLocks noGrp="1" noRot="1" noChangeAspect="1"/>
-          </p:cNvSpPr>
-          <p:nvPr>
-            <p:ph type="sldImg"/>
-          </p:nvPr>
-        </p:nvSpPr>
-        <p:spPr/>
-      </p:sp>
-      <p:sp>
-        <p:nvSpPr>
-          <p:cNvPr id="3" name="Notes Placeholder 2"/>
-          <p:cNvSpPr>
-            <a:spLocks noGrp="1"/>
-          </p:cNvSpPr>
-          <p:nvPr>
-            <p:ph type="body" idx="1"/>
-          </p:nvPr>
-        </p:nvSpPr>
-        <p:spPr/>
-        <p:txBody>
-          <a:bodyPr/>
-          <a:lstStyle/>
-          <a:p>
-            <a:endParaRPr lang="en-US" dirty="0"/>
-          </a:p>
-        </p:txBody>
-      </p:sp>
-      <p:sp>
-        <p:nvSpPr>
-          <p:cNvPr id="4" name="Slide Number Placeholder 3"/>
-          <p:cNvSpPr>
-            <a:spLocks noGrp="1"/>
-          </p:cNvSpPr>
-          <p:nvPr>
-            <p:ph type="sldNum" sz="quarter" idx="5"/>
-          </p:nvPr>
-        </p:nvSpPr>
-        <p:spPr/>
-        <p:txBody>
-          <a:bodyPr/>
-          <a:lstStyle/>
-          <a:p>
-            <a:fld id="{DAE5FABD-26C8-4F74-B1E3-45BC91BC9D7B}" type="slidenum">
-              <a:rPr lang="en-US" noProof="0" smtClean="0"/>
-              <a:pPr/>
-              <a:t>15</a:t>
-            </a:fld>
-            <a:endParaRPr lang="en-US" noProof="0" dirty="0"/>
-          </a:p>
-        </p:txBody>
-      </p:sp>
-    </p:spTree>
-    <p:extLst>
-      <p:ext uri="{BB962C8B-B14F-4D97-AF65-F5344CB8AC3E}">
-        <p14:creationId xmlns:p14="http://schemas.microsoft.com/office/powerpoint/2010/main" val="721928790"/>
-      </p:ext>
-    </p:extLst>
-  </p:cSld>
-  <p:clrMapOvr>
-    <a:masterClrMapping/>
-  </p:clrMapOvr>
-</p:notes>
-</file>
-
 <file path=ppt/notesSlides/notesSlide2.xml><?xml version="1.0" encoding="utf-8"?>
 <p:notes xmlns:a="http://schemas.openxmlformats.org/drawingml/2006/main" xmlns:r="http://schemas.openxmlformats.org/officeDocument/2006/relationships" xmlns:p="http://schemas.openxmlformats.org/presentationml/2006/main">
   <p:cSld>
@@ -8166,7 +8081,7 @@
             <a:fld id="{B61BEF0D-F0BB-DE4B-95CE-6DB70DBA9567}" type="datetimeFigureOut">
               <a:rPr lang="en-US" smtClean="0"/>
               <a:pPr/>
-              <a:t>11/16/2022</a:t>
+              <a:t>11/17/2022</a:t>
             </a:fld>
             <a:endParaRPr lang="en-US" dirty="0"/>
           </a:p>
@@ -8444,7 +8359,7 @@
             <a:fld id="{B61BEF0D-F0BB-DE4B-95CE-6DB70DBA9567}" type="datetimeFigureOut">
               <a:rPr lang="en-US" smtClean="0"/>
               <a:pPr/>
-              <a:t>11/16/2022</a:t>
+              <a:t>11/17/2022</a:t>
             </a:fld>
             <a:endParaRPr lang="en-US" dirty="0"/>
           </a:p>
@@ -8641,7 +8556,7 @@
             <a:fld id="{B61BEF0D-F0BB-DE4B-95CE-6DB70DBA9567}" type="datetimeFigureOut">
               <a:rPr lang="en-US" smtClean="0"/>
               <a:pPr/>
-              <a:t>11/16/2022</a:t>
+              <a:t>11/17/2022</a:t>
             </a:fld>
             <a:endParaRPr lang="en-US" dirty="0"/>
           </a:p>
@@ -8915,7 +8830,7 @@
             <a:fld id="{B61BEF0D-F0BB-DE4B-95CE-6DB70DBA9567}" type="datetimeFigureOut">
               <a:rPr lang="en-US" smtClean="0"/>
               <a:pPr/>
-              <a:t>11/16/2022</a:t>
+              <a:t>11/17/2022</a:t>
             </a:fld>
             <a:endParaRPr lang="en-US" dirty="0"/>
           </a:p>
@@ -9245,7 +9160,7 @@
             <a:fld id="{B61BEF0D-F0BB-DE4B-95CE-6DB70DBA9567}" type="datetimeFigureOut">
               <a:rPr lang="en-US" smtClean="0"/>
               <a:pPr/>
-              <a:t>11/16/2022</a:t>
+              <a:t>11/17/2022</a:t>
             </a:fld>
             <a:endParaRPr lang="en-US" dirty="0"/>
           </a:p>
@@ -9867,7 +9782,7 @@
             <a:fld id="{B61BEF0D-F0BB-DE4B-95CE-6DB70DBA9567}" type="datetimeFigureOut">
               <a:rPr lang="en-US" smtClean="0"/>
               <a:pPr/>
-              <a:t>11/16/2022</a:t>
+              <a:t>11/17/2022</a:t>
             </a:fld>
             <a:endParaRPr lang="en-US" dirty="0"/>
           </a:p>
@@ -10717,7 +10632,7 @@
             <a:fld id="{B61BEF0D-F0BB-DE4B-95CE-6DB70DBA9567}" type="datetimeFigureOut">
               <a:rPr lang="en-US" smtClean="0"/>
               <a:pPr/>
-              <a:t>11/16/2022</a:t>
+              <a:t>11/17/2022</a:t>
             </a:fld>
             <a:endParaRPr lang="en-US" dirty="0"/>
           </a:p>
@@ -10890,7 +10805,7 @@
             <a:fld id="{B61BEF0D-F0BB-DE4B-95CE-6DB70DBA9567}" type="datetimeFigureOut">
               <a:rPr lang="en-US" smtClean="0"/>
               <a:pPr/>
-              <a:t>11/16/2022</a:t>
+              <a:t>11/17/2022</a:t>
             </a:fld>
             <a:endParaRPr lang="en-US" dirty="0"/>
           </a:p>
@@ -11073,7 +10988,7 @@
             <a:fld id="{B61BEF0D-F0BB-DE4B-95CE-6DB70DBA9567}" type="datetimeFigureOut">
               <a:rPr lang="en-US" smtClean="0"/>
               <a:pPr/>
-              <a:t>11/16/2022</a:t>
+              <a:t>11/17/2022</a:t>
             </a:fld>
             <a:endParaRPr lang="en-US" dirty="0"/>
           </a:p>
@@ -12519,7 +12434,7 @@
           <a:p>
             <a:fld id="{52647F38-B617-4D2F-AE0A-013F0C4D2C57}" type="datetimeFigureOut">
               <a:rPr lang="en-US" smtClean="0"/>
-              <a:t>11/16/2022</a:t>
+              <a:t>11/17/2022</a:t>
             </a:fld>
             <a:endParaRPr lang="en-US" dirty="0"/>
           </a:p>
@@ -17510,7 +17425,7 @@
             <a:fld id="{B61BEF0D-F0BB-DE4B-95CE-6DB70DBA9567}" type="datetimeFigureOut">
               <a:rPr lang="en-US" smtClean="0"/>
               <a:pPr/>
-              <a:t>11/16/2022</a:t>
+              <a:t>11/17/2022</a:t>
             </a:fld>
             <a:endParaRPr lang="en-US" dirty="0"/>
           </a:p>
@@ -21320,7 +21235,7 @@
           <a:p>
             <a:fld id="{05BFA754-D5C3-4E66-96A6-867B257F58DC}" type="datetimeFigureOut">
               <a:rPr lang="en-US" smtClean="0"/>
-              <a:t>11/16/2022</a:t>
+              <a:t>11/17/2022</a:t>
             </a:fld>
             <a:endParaRPr lang="en-US" dirty="0"/>
           </a:p>
@@ -25130,7 +25045,7 @@
             <a:fld id="{B61BEF0D-F0BB-DE4B-95CE-6DB70DBA9567}" type="datetimeFigureOut">
               <a:rPr lang="en-US" smtClean="0"/>
               <a:pPr/>
-              <a:t>11/16/2022</a:t>
+              <a:t>11/17/2022</a:t>
             </a:fld>
             <a:endParaRPr lang="en-US" dirty="0"/>
           </a:p>
@@ -35656,7 +35571,7 @@
             <a:fld id="{B61BEF0D-F0BB-DE4B-95CE-6DB70DBA9567}" type="datetimeFigureOut">
               <a:rPr lang="en-US" smtClean="0"/>
               <a:pPr/>
-              <a:t>11/16/2022</a:t>
+              <a:t>11/17/2022</a:t>
             </a:fld>
             <a:endParaRPr lang="en-US" dirty="0"/>
           </a:p>
@@ -39860,7 +39775,7 @@
             <a:fld id="{B61BEF0D-F0BB-DE4B-95CE-6DB70DBA9567}" type="datetimeFigureOut">
               <a:rPr lang="en-US" smtClean="0"/>
               <a:pPr/>
-              <a:t>11/16/2022</a:t>
+              <a:t>11/17/2022</a:t>
             </a:fld>
             <a:endParaRPr lang="en-US" dirty="0"/>
           </a:p>
@@ -41299,7 +41214,7 @@
             <a:fld id="{B61BEF0D-F0BB-DE4B-95CE-6DB70DBA9567}" type="datetimeFigureOut">
               <a:rPr lang="en-US" smtClean="0"/>
               <a:pPr/>
-              <a:t>11/16/2022</a:t>
+              <a:t>11/17/2022</a:t>
             </a:fld>
             <a:endParaRPr lang="en-US" dirty="0"/>
           </a:p>
@@ -41577,7 +41492,7 @@
             <a:fld id="{B61BEF0D-F0BB-DE4B-95CE-6DB70DBA9567}" type="datetimeFigureOut">
               <a:rPr lang="en-US" smtClean="0"/>
               <a:pPr/>
-              <a:t>11/16/2022</a:t>
+              <a:t>11/17/2022</a:t>
             </a:fld>
             <a:endParaRPr lang="en-US" dirty="0"/>
           </a:p>
@@ -42003,7 +41918,7 @@
             <a:fld id="{B61BEF0D-F0BB-DE4B-95CE-6DB70DBA9567}" type="datetimeFigureOut">
               <a:rPr lang="en-US" smtClean="0"/>
               <a:pPr/>
-              <a:t>11/16/2022</a:t>
+              <a:t>11/17/2022</a:t>
             </a:fld>
             <a:endParaRPr lang="en-US" dirty="0"/>
           </a:p>
@@ -43618,18 +43533,18 @@
       </p:grpSpPr>
       <p:sp>
         <p:nvSpPr>
-          <p:cNvPr id="12" name="Title 11">
-            <a:extLst>
-              <a:ext uri="{FF2B5EF4-FFF2-40B4-BE49-F238E27FC236}">
-                <a16:creationId xmlns:a16="http://schemas.microsoft.com/office/drawing/2014/main" id="{94C582A2-A406-4C9B-A3DA-BA4EECAB37AC}"/>
-              </a:ext>
-            </a:extLst>
-          </p:cNvPr>
-          <p:cNvSpPr>
-            <a:spLocks noGrp="1"/>
-          </p:cNvSpPr>
-          <p:nvPr>
-            <p:ph type="title"/>
+          <p:cNvPr id="2" name="Text Placeholder 1">
+            <a:extLst>
+              <a:ext uri="{FF2B5EF4-FFF2-40B4-BE49-F238E27FC236}">
+                <a16:creationId xmlns:a16="http://schemas.microsoft.com/office/drawing/2014/main" id="{3E70BEF9-A596-4B20-9834-F999BC418804}"/>
+              </a:ext>
+            </a:extLst>
+          </p:cNvPr>
+          <p:cNvSpPr>
+            <a:spLocks noGrp="1"/>
+          </p:cNvSpPr>
+          <p:nvPr>
+            <p:ph type="body" sz="quarter" idx="13"/>
           </p:nvPr>
         </p:nvSpPr>
         <p:spPr/>
@@ -43637,62 +43552,24 @@
           <a:bodyPr/>
           <a:lstStyle/>
           <a:p>
-            <a:r>
-              <a:rPr lang="en-US" dirty="0"/>
-              <a:t>Conclusion</a:t>
-            </a:r>
-          </a:p>
-        </p:txBody>
-      </p:sp>
-      <p:sp>
-        <p:nvSpPr>
-          <p:cNvPr id="13" name="Content Placeholder 12">
-            <a:extLst>
-              <a:ext uri="{FF2B5EF4-FFF2-40B4-BE49-F238E27FC236}">
-                <a16:creationId xmlns:a16="http://schemas.microsoft.com/office/drawing/2014/main" id="{556610ED-3E2D-4E6A-ABD0-150F203E6B46}"/>
-              </a:ext>
-            </a:extLst>
-          </p:cNvPr>
-          <p:cNvSpPr>
-            <a:spLocks noGrp="1"/>
-          </p:cNvSpPr>
-          <p:nvPr>
-            <p:ph sz="quarter" idx="13"/>
-          </p:nvPr>
-        </p:nvSpPr>
-        <p:spPr>
-          <a:xfrm>
-            <a:off x="548640" y="2231886"/>
-            <a:ext cx="10288693" cy="4095762"/>
-          </a:xfrm>
-        </p:spPr>
-        <p:txBody>
-          <a:bodyPr>
-            <a:normAutofit/>
-          </a:bodyPr>
-          <a:lstStyle/>
-          <a:p>
-            <a:pPr marL="0" indent="0" algn="just">
-              <a:buNone/>
-            </a:pPr>
-            <a:endParaRPr lang="en-US" dirty="0"/>
-          </a:p>
-        </p:txBody>
-      </p:sp>
-      <p:sp>
-        <p:nvSpPr>
-          <p:cNvPr id="3" name="Slide Number Placeholder 2">
-            <a:extLst>
-              <a:ext uri="{FF2B5EF4-FFF2-40B4-BE49-F238E27FC236}">
-                <a16:creationId xmlns:a16="http://schemas.microsoft.com/office/drawing/2014/main" id="{5F44A039-11AB-474F-8746-9A34D1C39C3F}"/>
-              </a:ext>
-            </a:extLst>
-          </p:cNvPr>
-          <p:cNvSpPr>
-            <a:spLocks noGrp="1"/>
-          </p:cNvSpPr>
-          <p:nvPr>
-            <p:ph type="sldNum" sz="quarter" idx="4"/>
+            <a:endParaRPr lang="en-IN"/>
+          </a:p>
+        </p:txBody>
+      </p:sp>
+      <p:sp>
+        <p:nvSpPr>
+          <p:cNvPr id="3" name="Text Placeholder 2">
+            <a:extLst>
+              <a:ext uri="{FF2B5EF4-FFF2-40B4-BE49-F238E27FC236}">
+                <a16:creationId xmlns:a16="http://schemas.microsoft.com/office/drawing/2014/main" id="{2DDB172F-AAB2-4AED-A6ED-6F1D7A1A506A}"/>
+              </a:ext>
+            </a:extLst>
+          </p:cNvPr>
+          <p:cNvSpPr>
+            <a:spLocks noGrp="1"/>
+          </p:cNvSpPr>
+          <p:nvPr>
+            <p:ph type="body" sz="quarter" idx="22"/>
           </p:nvPr>
         </p:nvSpPr>
         <p:spPr/>
@@ -43700,285 +43577,75 @@
           <a:bodyPr/>
           <a:lstStyle/>
           <a:p>
-            <a:fld id="{4FAB73BC-B049-4115-A692-8D63A059BFB8}" type="slidenum">
-              <a:rPr lang="en-US" smtClean="0"/>
-              <a:pPr/>
-              <a:t>15</a:t>
-            </a:fld>
-            <a:endParaRPr lang="en-US" dirty="0"/>
-          </a:p>
-        </p:txBody>
-      </p:sp>
-      <p:sp>
-        <p:nvSpPr>
-          <p:cNvPr id="18" name="Text Placeholder 119">
-            <a:extLst>
-              <a:ext uri="{FF2B5EF4-FFF2-40B4-BE49-F238E27FC236}">
-                <a16:creationId xmlns:a16="http://schemas.microsoft.com/office/drawing/2014/main" id="{6E5B80C5-6B42-4867-88CC-660291DD3F8D}"/>
-              </a:ext>
-              <a:ext uri="{C183D7F6-B498-43B3-948B-1728B52AA6E4}">
-                <adec:decorative xmlns:adec="http://schemas.microsoft.com/office/drawing/2017/decorative" val="1"/>
-              </a:ext>
-            </a:extLst>
-          </p:cNvPr>
-          <p:cNvSpPr txBox="1">
-            <a:spLocks/>
-          </p:cNvSpPr>
-          <p:nvPr/>
-        </p:nvSpPr>
-        <p:spPr>
-          <a:xfrm>
-            <a:off x="693060" y="6641305"/>
-            <a:ext cx="173736" cy="152400"/>
-          </a:xfrm>
-          <a:prstGeom prst="rect">
-            <a:avLst/>
-          </a:prstGeom>
-          <a:solidFill>
-            <a:schemeClr val="accent2"/>
-          </a:solidFill>
-          <a:effectLst>
-            <a:outerShdw blurRad="50800" dist="38100" dir="2700000" algn="tl" rotWithShape="0">
-              <a:prstClr val="black">
-                <a:alpha val="40000"/>
-              </a:prstClr>
-            </a:outerShdw>
-          </a:effectLst>
-        </p:spPr>
-        <p:txBody>
-          <a:bodyPr vert="horz" lIns="45720" tIns="45720" rIns="45720" bIns="45720" rtlCol="0">
-            <a:normAutofit fontScale="25000" lnSpcReduction="20000"/>
-          </a:bodyPr>
-          <a:lstStyle>
-            <a:lvl1pPr marL="0" indent="0" algn="l" defTabSz="914400" rtl="0" eaLnBrk="1" latinLnBrk="0" hangingPunct="1">
-              <a:lnSpc>
-                <a:spcPct val="90000"/>
-              </a:lnSpc>
-              <a:spcBef>
-                <a:spcPts val="1200"/>
-              </a:spcBef>
-              <a:spcAft>
-                <a:spcPts val="200"/>
-              </a:spcAft>
-              <a:buClr>
-                <a:schemeClr val="accent1"/>
-              </a:buClr>
-              <a:buSzPct val="100000"/>
-              <a:buFont typeface="Arial" panose="020B0604020202020204" pitchFamily="34" charset="0"/>
-              <a:buNone/>
-              <a:defRPr sz="2000" kern="1200">
-                <a:solidFill>
-                  <a:schemeClr val="tx1">
-                    <a:alpha val="0"/>
-                  </a:schemeClr>
-                </a:solidFill>
-                <a:latin typeface="+mn-lt"/>
-                <a:ea typeface="+mn-ea"/>
-                <a:cs typeface="+mn-cs"/>
-              </a:defRPr>
-            </a:lvl1pPr>
-            <a:lvl2pPr marL="457200" indent="-228600" algn="l" defTabSz="914400" rtl="0" eaLnBrk="1" latinLnBrk="0" hangingPunct="1">
-              <a:lnSpc>
-                <a:spcPct val="90000"/>
-              </a:lnSpc>
-              <a:spcBef>
-                <a:spcPts val="200"/>
-              </a:spcBef>
-              <a:spcAft>
-                <a:spcPts val="400"/>
-              </a:spcAft>
-              <a:buClr>
-                <a:schemeClr val="accent1"/>
-              </a:buClr>
-              <a:buFont typeface="Arial" panose="020B0604020202020204" pitchFamily="34" charset="0"/>
-              <a:buChar char="•"/>
-              <a:defRPr sz="1800" kern="1200">
+            <a:endParaRPr lang="en-IN"/>
+          </a:p>
+        </p:txBody>
+      </p:sp>
+      <p:sp>
+        <p:nvSpPr>
+          <p:cNvPr id="4" name="Title 3">
+            <a:extLst>
+              <a:ext uri="{FF2B5EF4-FFF2-40B4-BE49-F238E27FC236}">
+                <a16:creationId xmlns:a16="http://schemas.microsoft.com/office/drawing/2014/main" id="{43C779DB-3D15-4CF3-BE91-1B42546CAD62}"/>
+              </a:ext>
+            </a:extLst>
+          </p:cNvPr>
+          <p:cNvSpPr>
+            <a:spLocks noGrp="1"/>
+          </p:cNvSpPr>
+          <p:nvPr>
+            <p:ph type="title"/>
+          </p:nvPr>
+        </p:nvSpPr>
+        <p:spPr/>
+        <p:txBody>
+          <a:bodyPr/>
+          <a:lstStyle/>
+          <a:p>
+            <a:r>
+              <a:rPr lang="en-IN" dirty="0"/>
+              <a:t>            </a:t>
+            </a:r>
+            <a:r>
+              <a:rPr lang="en-IN" dirty="0">
                 <a:solidFill>
                   <a:schemeClr val="tx1"/>
                 </a:solidFill>
-                <a:latin typeface="+mn-lt"/>
-                <a:ea typeface="+mn-ea"/>
-                <a:cs typeface="+mn-cs"/>
-              </a:defRPr>
-            </a:lvl2pPr>
-            <a:lvl3pPr marL="685800" indent="-228600" algn="l" defTabSz="914400" rtl="0" eaLnBrk="1" latinLnBrk="0" hangingPunct="1">
-              <a:lnSpc>
-                <a:spcPct val="90000"/>
-              </a:lnSpc>
-              <a:spcBef>
-                <a:spcPts val="200"/>
-              </a:spcBef>
-              <a:spcAft>
-                <a:spcPts val="400"/>
-              </a:spcAft>
-              <a:buClr>
-                <a:schemeClr val="accent1"/>
-              </a:buClr>
-              <a:buFont typeface="Arial" panose="020B0604020202020204" pitchFamily="34" charset="0"/>
-              <a:buChar char="•"/>
-              <a:defRPr sz="1600" kern="1200">
-                <a:solidFill>
-                  <a:schemeClr val="tx1"/>
-                </a:solidFill>
-                <a:latin typeface="+mn-lt"/>
-                <a:ea typeface="+mn-ea"/>
-                <a:cs typeface="+mn-cs"/>
-              </a:defRPr>
-            </a:lvl3pPr>
-            <a:lvl4pPr marL="914400" indent="-228600" algn="l" defTabSz="914400" rtl="0" eaLnBrk="1" latinLnBrk="0" hangingPunct="1">
-              <a:lnSpc>
-                <a:spcPct val="90000"/>
-              </a:lnSpc>
-              <a:spcBef>
-                <a:spcPts val="200"/>
-              </a:spcBef>
-              <a:spcAft>
-                <a:spcPts val="400"/>
-              </a:spcAft>
-              <a:buClr>
-                <a:schemeClr val="accent1"/>
-              </a:buClr>
-              <a:buFont typeface="Arial" panose="020B0604020202020204" pitchFamily="34" charset="0"/>
-              <a:buChar char="•"/>
-              <a:defRPr sz="1400" kern="1200">
-                <a:solidFill>
-                  <a:schemeClr val="tx1"/>
-                </a:solidFill>
-                <a:latin typeface="+mn-lt"/>
-                <a:ea typeface="+mn-ea"/>
-                <a:cs typeface="+mn-cs"/>
-              </a:defRPr>
-            </a:lvl4pPr>
-            <a:lvl5pPr marL="1143000" indent="-228600" algn="l" defTabSz="914400" rtl="0" eaLnBrk="1" latinLnBrk="0" hangingPunct="1">
-              <a:lnSpc>
-                <a:spcPct val="90000"/>
-              </a:lnSpc>
-              <a:spcBef>
-                <a:spcPts val="200"/>
-              </a:spcBef>
-              <a:spcAft>
-                <a:spcPts val="400"/>
-              </a:spcAft>
-              <a:buClr>
-                <a:schemeClr val="accent1"/>
-              </a:buClr>
-              <a:buFont typeface="Arial" panose="020B0604020202020204" pitchFamily="34" charset="0"/>
-              <a:buChar char="•"/>
-              <a:defRPr sz="1400" kern="1200">
-                <a:solidFill>
-                  <a:schemeClr val="tx1"/>
-                </a:solidFill>
-                <a:latin typeface="+mn-lt"/>
-                <a:ea typeface="+mn-ea"/>
-                <a:cs typeface="+mn-cs"/>
-              </a:defRPr>
-            </a:lvl5pPr>
-            <a:lvl6pPr marL="914400" indent="-137160" algn="l" defTabSz="914400" rtl="0" eaLnBrk="1" latinLnBrk="0" hangingPunct="1">
-              <a:lnSpc>
-                <a:spcPct val="90000"/>
-              </a:lnSpc>
-              <a:spcBef>
-                <a:spcPts val="200"/>
-              </a:spcBef>
-              <a:spcAft>
-                <a:spcPts val="400"/>
-              </a:spcAft>
-              <a:buClr>
-                <a:schemeClr val="accent1"/>
-              </a:buClr>
-              <a:buFont typeface="Wingdings 3" pitchFamily="18" charset="2"/>
-              <a:buChar char=""/>
-              <a:defRPr sz="1400" kern="1200">
-                <a:solidFill>
-                  <a:schemeClr val="tx1"/>
-                </a:solidFill>
-                <a:latin typeface="+mn-lt"/>
-                <a:ea typeface="+mn-ea"/>
-                <a:cs typeface="+mn-cs"/>
-              </a:defRPr>
-            </a:lvl6pPr>
-            <a:lvl7pPr marL="1060704" indent="-137160" algn="l" defTabSz="914400" rtl="0" eaLnBrk="1" latinLnBrk="0" hangingPunct="1">
-              <a:lnSpc>
-                <a:spcPct val="90000"/>
-              </a:lnSpc>
-              <a:spcBef>
-                <a:spcPts val="200"/>
-              </a:spcBef>
-              <a:spcAft>
-                <a:spcPts val="400"/>
-              </a:spcAft>
-              <a:buClr>
-                <a:schemeClr val="accent1"/>
-              </a:buClr>
-              <a:buFont typeface="Wingdings 3" pitchFamily="18" charset="2"/>
-              <a:buChar char=""/>
-              <a:defRPr sz="1400" kern="1200">
-                <a:solidFill>
-                  <a:schemeClr val="tx1"/>
-                </a:solidFill>
-                <a:latin typeface="+mn-lt"/>
-                <a:ea typeface="+mn-ea"/>
-                <a:cs typeface="+mn-cs"/>
-              </a:defRPr>
-            </a:lvl7pPr>
-            <a:lvl8pPr marL="1216152" indent="-137160" algn="l" defTabSz="914400" rtl="0" eaLnBrk="1" latinLnBrk="0" hangingPunct="1">
-              <a:lnSpc>
-                <a:spcPct val="90000"/>
-              </a:lnSpc>
-              <a:spcBef>
-                <a:spcPts val="200"/>
-              </a:spcBef>
-              <a:spcAft>
-                <a:spcPts val="400"/>
-              </a:spcAft>
-              <a:buClr>
-                <a:schemeClr val="accent1"/>
-              </a:buClr>
-              <a:buFont typeface="Wingdings 3" pitchFamily="18" charset="2"/>
-              <a:buChar char=""/>
-              <a:defRPr sz="1400" kern="1200">
-                <a:solidFill>
-                  <a:schemeClr val="tx1"/>
-                </a:solidFill>
-                <a:latin typeface="+mn-lt"/>
-                <a:ea typeface="+mn-ea"/>
-                <a:cs typeface="+mn-cs"/>
-              </a:defRPr>
-            </a:lvl8pPr>
-            <a:lvl9pPr marL="1362456" indent="-137160" algn="l" defTabSz="914400" rtl="0" eaLnBrk="1" latinLnBrk="0" hangingPunct="1">
-              <a:lnSpc>
-                <a:spcPct val="90000"/>
-              </a:lnSpc>
-              <a:spcBef>
-                <a:spcPts val="200"/>
-              </a:spcBef>
-              <a:spcAft>
-                <a:spcPts val="400"/>
-              </a:spcAft>
-              <a:buClr>
-                <a:schemeClr val="accent1"/>
-              </a:buClr>
-              <a:buFont typeface="Wingdings 3" pitchFamily="18" charset="2"/>
-              <a:buChar char=""/>
-              <a:defRPr sz="1400" kern="1200">
-                <a:solidFill>
-                  <a:schemeClr val="tx1"/>
-                </a:solidFill>
-                <a:latin typeface="+mn-lt"/>
-                <a:ea typeface="+mn-ea"/>
-                <a:cs typeface="+mn-cs"/>
-              </a:defRPr>
-            </a:lvl9pPr>
-          </a:lstStyle>
-          <a:p>
-            <a:endParaRPr lang="en-US" dirty="0"/>
+              </a:rPr>
+              <a:t>THANK YOU</a:t>
+            </a:r>
+          </a:p>
+        </p:txBody>
+      </p:sp>
+      <p:sp>
+        <p:nvSpPr>
+          <p:cNvPr id="5" name="Text Placeholder 4">
+            <a:extLst>
+              <a:ext uri="{FF2B5EF4-FFF2-40B4-BE49-F238E27FC236}">
+                <a16:creationId xmlns:a16="http://schemas.microsoft.com/office/drawing/2014/main" id="{630615CD-9E64-4986-95D3-355156C850F8}"/>
+              </a:ext>
+            </a:extLst>
+          </p:cNvPr>
+          <p:cNvSpPr>
+            <a:spLocks noGrp="1"/>
+          </p:cNvSpPr>
+          <p:nvPr>
+            <p:ph type="body" sz="quarter" idx="23"/>
+          </p:nvPr>
+        </p:nvSpPr>
+        <p:spPr/>
+        <p:txBody>
+          <a:bodyPr/>
+          <a:lstStyle/>
+          <a:p>
+            <a:endParaRPr lang="en-IN"/>
           </a:p>
         </p:txBody>
       </p:sp>
     </p:spTree>
     <p:extLst>
       <p:ext uri="{BB962C8B-B14F-4D97-AF65-F5344CB8AC3E}">
-        <p14:creationId xmlns:p14="http://schemas.microsoft.com/office/powerpoint/2010/main" val="980505818"/>
+        <p14:creationId xmlns:p14="http://schemas.microsoft.com/office/powerpoint/2010/main" val="4150369359"/>
       </p:ext>
     </p:extLst>
   </p:cSld>
@@ -49183,6 +48850,15 @@
 </file>
 
 <file path=customXml/item1.xml><?xml version="1.0" encoding="utf-8"?>
+<?mso-contentType ?>
+<FormTemplates xmlns="http://schemas.microsoft.com/sharepoint/v3/contenttype/forms">
+  <Display>DocumentLibraryForm</Display>
+  <Edit>DocumentLibraryForm</Edit>
+  <New>DocumentLibraryForm</New>
+</FormTemplates>
+</file>
+
+<file path=customXml/item2.xml><?xml version="1.0" encoding="utf-8"?>
 <ct:contentTypeSchema xmlns:ct="http://schemas.microsoft.com/office/2006/metadata/contentType" xmlns:ma="http://schemas.microsoft.com/office/2006/metadata/properties/metaAttributes" ct:_="" ma:_="" ma:contentTypeName="Document" ma:contentTypeID="0x01010079F111ED35F8CC479449609E8A0923A6" ma:contentTypeVersion="12" ma:contentTypeDescription="Create a new document." ma:contentTypeScope="" ma:versionID="f9fc9171bb41dc08635275f351de8590">
   <xsd:schema xmlns:xsd="http://www.w3.org/2001/XMLSchema" xmlns:xs="http://www.w3.org/2001/XMLSchema" xmlns:p="http://schemas.microsoft.com/office/2006/metadata/properties" xmlns:ns2="71af3243-3dd4-4a8d-8c0d-dd76da1f02a5" xmlns:ns3="16c05727-aa75-4e4a-9b5f-8a80a1165891" targetNamespace="http://schemas.microsoft.com/office/2006/metadata/properties" ma:root="true" ma:fieldsID="29387215989a890c06011de04edfe97d" ns2:_="" ns3:_="">
     <xsd:import namespace="71af3243-3dd4-4a8d-8c0d-dd76da1f02a5"/>
@@ -49403,15 +49079,6 @@
 </ct:contentTypeSchema>
 </file>
 
-<file path=customXml/item2.xml><?xml version="1.0" encoding="utf-8"?>
-<?mso-contentType ?>
-<FormTemplates xmlns="http://schemas.microsoft.com/sharepoint/v3/contenttype/forms">
-  <Display>DocumentLibraryForm</Display>
-  <Edit>DocumentLibraryForm</Edit>
-  <New>DocumentLibraryForm</New>
-</FormTemplates>
-</file>
-
 <file path=customXml/item3.xml><?xml version="1.0" encoding="utf-8"?>
 <p:properties xmlns:p="http://schemas.microsoft.com/office/2006/metadata/properties" xmlns:xsi="http://www.w3.org/2001/XMLSchema-instance" xmlns:pc="http://schemas.microsoft.com/office/infopath/2007/PartnerControls">
   <documentManagement>
@@ -49422,6 +49089,14 @@
 </file>
 
 <file path=customXml/itemProps1.xml><?xml version="1.0" encoding="utf-8"?>
+<ds:datastoreItem xmlns:ds="http://schemas.openxmlformats.org/officeDocument/2006/customXml" ds:itemID="{8106BD98-E608-40A1-98A8-93D5976215CA}">
+  <ds:schemaRefs>
+    <ds:schemaRef ds:uri="http://schemas.microsoft.com/sharepoint/v3/contenttype/forms"/>
+  </ds:schemaRefs>
+</ds:datastoreItem>
+</file>
+
+<file path=customXml/itemProps2.xml><?xml version="1.0" encoding="utf-8"?>
 <ds:datastoreItem xmlns:ds="http://schemas.openxmlformats.org/officeDocument/2006/customXml" ds:itemID="{9BFCA5F6-1A5A-4D78-BDE2-C793B61E0E12}">
   <ds:schemaRefs>
     <ds:schemaRef ds:uri="http://schemas.microsoft.com/office/2006/metadata/contentType"/>
@@ -49436,14 +49111,6 @@
     <ds:schemaRef ds:uri="http://purl.org/dc/elements/1.1/"/>
     <ds:schemaRef ds:uri="http://purl.org/dc/terms/"/>
     <ds:schemaRef ds:uri="http://schemas.microsoft.com/internal/obd"/>
-  </ds:schemaRefs>
-</ds:datastoreItem>
-</file>
-
-<file path=customXml/itemProps2.xml><?xml version="1.0" encoding="utf-8"?>
-<ds:datastoreItem xmlns:ds="http://schemas.openxmlformats.org/officeDocument/2006/customXml" ds:itemID="{8106BD98-E608-40A1-98A8-93D5976215CA}">
-  <ds:schemaRefs>
-    <ds:schemaRef ds:uri="http://schemas.microsoft.com/sharepoint/v3/contenttype/forms"/>
   </ds:schemaRefs>
 </ds:datastoreItem>
 </file>

</xml_diff>